<commit_message>
RTA files are old. Updated TriPASS data. New events worksheet produced in Excel file.
</commit_message>
<xml_diff>
--- a/Excel_R_20200721.pptx
+++ b/Excel_R_20200721.pptx
@@ -5,7 +5,7 @@
     <p:sldMasterId id="2147483648" r:id="rId1"/>
   </p:sldMasterIdLst>
   <p:notesMasterIdLst>
-    <p:notesMasterId r:id="rId37"/>
+    <p:notesMasterId r:id="rId43"/>
   </p:notesMasterIdLst>
   <p:sldIdLst>
     <p:sldId id="256" r:id="rId2"/>
@@ -43,6 +43,12 @@
     <p:sldId id="278" r:id="rId34"/>
     <p:sldId id="279" r:id="rId35"/>
     <p:sldId id="287" r:id="rId36"/>
+    <p:sldId id="295" r:id="rId37"/>
+    <p:sldId id="296" r:id="rId38"/>
+    <p:sldId id="298" r:id="rId39"/>
+    <p:sldId id="299" r:id="rId40"/>
+    <p:sldId id="300" r:id="rId41"/>
+    <p:sldId id="297" r:id="rId42"/>
   </p:sldIdLst>
   <p:sldSz cx="12192000" cy="6858000"/>
   <p:notesSz cx="6858000" cy="9144000"/>
@@ -231,7 +237,7 @@
           <a:p>
             <a:fld id="{A871055D-C4CC-4A7A-A709-70A3E98773C6}" type="datetimeFigureOut">
               <a:rPr lang="en-US" smtClean="0"/>
-              <a:t>7/20/2020</a:t>
+              <a:t>7/21/2020</a:t>
             </a:fld>
             <a:endParaRPr lang="en-US"/>
           </a:p>
@@ -295,38 +301,37 @@
           <a:p>
             <a:pPr lvl="0"/>
             <a:r>
-              <a:rPr lang="en-US" smtClean="0"/>
+              <a:rPr lang="en-US"/>
               <a:t>Edit Master text styles</a:t>
             </a:r>
           </a:p>
           <a:p>
             <a:pPr lvl="1"/>
             <a:r>
-              <a:rPr lang="en-US" smtClean="0"/>
+              <a:rPr lang="en-US"/>
               <a:t>Second level</a:t>
             </a:r>
           </a:p>
           <a:p>
             <a:pPr lvl="2"/>
             <a:r>
-              <a:rPr lang="en-US" smtClean="0"/>
+              <a:rPr lang="en-US"/>
               <a:t>Third level</a:t>
             </a:r>
           </a:p>
           <a:p>
             <a:pPr lvl="3"/>
             <a:r>
-              <a:rPr lang="en-US" smtClean="0"/>
+              <a:rPr lang="en-US"/>
               <a:t>Fourth level</a:t>
             </a:r>
           </a:p>
           <a:p>
             <a:pPr lvl="4"/>
             <a:r>
-              <a:rPr lang="en-US" smtClean="0"/>
+              <a:rPr lang="en-US"/>
               <a:t>Fifth level</a:t>
             </a:r>
-            <a:endParaRPr lang="en-US"/>
           </a:p>
         </p:txBody>
       </p:sp>
@@ -544,15 +549,15 @@
           <a:lstStyle/>
           <a:p>
             <a:r>
-              <a:rPr lang="en-US" dirty="0" smtClean="0"/>
+              <a:rPr lang="en-US" dirty="0"/>
               <a:t>Nice</a:t>
             </a:r>
             <a:r>
-              <a:rPr lang="en-US" baseline="0" dirty="0" smtClean="0"/>
+              <a:rPr lang="en-US" baseline="0" dirty="0"/>
               <a:t> R Package tutorial: </a:t>
             </a:r>
             <a:r>
-              <a:rPr lang="en-US" dirty="0" smtClean="0">
+              <a:rPr lang="en-US" dirty="0">
                 <a:hlinkClick r:id="rId3"/>
               </a:rPr>
               <a:t>https://www.tutorialgateway.org/install-r-packages/</a:t>
@@ -642,11 +647,11 @@
           <a:lstStyle/>
           <a:p>
             <a:r>
-              <a:rPr lang="en-US" dirty="0" smtClean="0"/>
+              <a:rPr lang="en-US" dirty="0"/>
               <a:t>Too much but</a:t>
             </a:r>
             <a:r>
-              <a:rPr lang="en-US" baseline="0" dirty="0" smtClean="0"/>
+              <a:rPr lang="en-US" baseline="0" dirty="0"/>
               <a:t> aiming to complete by Analytics&gt;Forward 2020.</a:t>
             </a:r>
             <a:endParaRPr lang="en-US" dirty="0"/>
@@ -734,11 +739,11 @@
           <a:lstStyle/>
           <a:p>
             <a:r>
-              <a:rPr lang="en-US" dirty="0" smtClean="0"/>
+              <a:rPr lang="en-US" dirty="0"/>
               <a:t>This is not a tutorial. Focusing on the story</a:t>
             </a:r>
             <a:r>
-              <a:rPr lang="en-US" baseline="0" dirty="0" smtClean="0"/>
+              <a:rPr lang="en-US" baseline="0" dirty="0"/>
               <a:t> in pursuit of connection and inspiring deeper engagement with R packages.</a:t>
             </a:r>
             <a:endParaRPr lang="en-US" dirty="0"/>
@@ -826,11 +831,11 @@
           <a:lstStyle/>
           <a:p>
             <a:r>
-              <a:rPr lang="en-US" dirty="0" smtClean="0"/>
+              <a:rPr lang="en-US" dirty="0"/>
               <a:t>Integrated Development Environment,</a:t>
             </a:r>
             <a:r>
-              <a:rPr lang="en-US" baseline="0" dirty="0" smtClean="0"/>
+              <a:rPr lang="en-US" baseline="0" dirty="0"/>
               <a:t> R Studio</a:t>
             </a:r>
             <a:endParaRPr lang="en-US" dirty="0"/>
@@ -918,19 +923,19 @@
           <a:lstStyle/>
           <a:p>
             <a:r>
-              <a:rPr lang="en-US" dirty="0" smtClean="0"/>
+              <a:rPr lang="en-US" dirty="0"/>
               <a:t>On the </a:t>
             </a:r>
             <a:r>
-              <a:rPr lang="en-US" dirty="0" err="1" smtClean="0"/>
+              <a:rPr lang="en-US" dirty="0" err="1"/>
               <a:t>Github</a:t>
             </a:r>
             <a:r>
-              <a:rPr lang="en-US" dirty="0" smtClean="0"/>
+              <a:rPr lang="en-US" dirty="0"/>
               <a:t> page, small print,</a:t>
             </a:r>
             <a:r>
-              <a:rPr lang="en-US" baseline="0" dirty="0" smtClean="0"/>
+              <a:rPr lang="en-US" baseline="0" dirty="0"/>
               <a:t> so let’s zoom in before you experience eye strain.</a:t>
             </a:r>
             <a:endParaRPr lang="en-US" dirty="0"/>
@@ -1018,10 +1023,9 @@
           <a:lstStyle/>
           <a:p>
             <a:r>
-              <a:rPr lang="en-US" dirty="0" smtClean="0"/>
+              <a:rPr lang="en-US" dirty="0"/>
               <a:t>Only returned my email address.</a:t>
             </a:r>
-            <a:endParaRPr lang="en-US" dirty="0"/>
           </a:p>
         </p:txBody>
       </p:sp>
@@ -1123,7 +1127,7 @@
               <a:defRPr/>
             </a:pPr>
             <a:r>
-              <a:rPr lang="en-US" dirty="0" smtClean="0">
+              <a:rPr lang="en-US" dirty="0">
                 <a:effectLst/>
               </a:rPr>
               <a:t>joined: Time member joined, represented as milliseconds since the epoch</a:t>
@@ -1299,10 +1303,9 @@
           <a:lstStyle/>
           <a:p>
             <a:r>
-              <a:rPr lang="en-US" dirty="0" smtClean="0"/>
+              <a:rPr lang="en-US" dirty="0"/>
               <a:t>Maybe skip backports</a:t>
             </a:r>
-            <a:endParaRPr lang="en-US" dirty="0"/>
           </a:p>
         </p:txBody>
       </p:sp>
@@ -1387,22 +1390,21 @@
           <a:lstStyle/>
           <a:p>
             <a:r>
-              <a:rPr lang="en-US" dirty="0" err="1" smtClean="0"/>
+              <a:rPr lang="en-US" dirty="0" err="1"/>
               <a:t>install.packages</a:t>
             </a:r>
             <a:r>
-              <a:rPr lang="en-US" dirty="0" smtClean="0"/>
+              <a:rPr lang="en-US" dirty="0"/>
               <a:t>('</a:t>
             </a:r>
             <a:r>
-              <a:rPr lang="en-US" dirty="0" err="1" smtClean="0"/>
+              <a:rPr lang="en-US" dirty="0" err="1"/>
               <a:t>gganimate</a:t>
             </a:r>
             <a:r>
-              <a:rPr lang="en-US" dirty="0" smtClean="0"/>
+              <a:rPr lang="en-US" dirty="0"/>
               <a:t>')</a:t>
             </a:r>
-            <a:endParaRPr lang="en-US" dirty="0"/>
           </a:p>
         </p:txBody>
       </p:sp>
@@ -1487,18 +1489,18 @@
           <a:lstStyle/>
           <a:p>
             <a:r>
-              <a:rPr lang="en-US" dirty="0" smtClean="0"/>
+              <a:rPr lang="en-US" dirty="0"/>
               <a:t>After upgrading R, </a:t>
             </a:r>
             <a:r>
-              <a:rPr lang="en-US" baseline="0" dirty="0" smtClean="0"/>
+              <a:rPr lang="en-US" baseline="0" dirty="0"/>
               <a:t> error may be hidden in code if run all at the same time.</a:t>
             </a:r>
             <a:br>
-              <a:rPr lang="en-US" baseline="0" dirty="0" smtClean="0"/>
+              <a:rPr lang="en-US" baseline="0" dirty="0"/>
             </a:br>
             <a:r>
-              <a:rPr lang="en-US" sz="1200" kern="1200" dirty="0" smtClean="0">
+              <a:rPr lang="en-US" sz="1200" kern="1200" dirty="0">
                 <a:solidFill>
                   <a:schemeClr val="tx1"/>
                 </a:solidFill>
@@ -1510,7 +1512,7 @@
               <a:t>Meetup is moving to OAuth *only* as of 2019-08-15. Set `</a:t>
             </a:r>
             <a:r>
-              <a:rPr lang="en-US" sz="1200" kern="1200" dirty="0" err="1" smtClean="0">
+              <a:rPr lang="en-US" sz="1200" kern="1200" dirty="0" err="1">
                 <a:solidFill>
                   <a:schemeClr val="tx1"/>
                 </a:solidFill>
@@ -1522,7 +1524,7 @@
               <a:t>meetupr.use_oauth</a:t>
             </a:r>
             <a:r>
-              <a:rPr lang="en-US" sz="1200" kern="1200" dirty="0" smtClean="0">
+              <a:rPr lang="en-US" sz="1200" kern="1200" dirty="0">
                 <a:solidFill>
                   <a:schemeClr val="tx1"/>
                 </a:solidFill>
@@ -1534,7 +1536,7 @@
               <a:t> = FALSE` in your .</a:t>
             </a:r>
             <a:r>
-              <a:rPr lang="en-US" sz="1200" kern="1200" dirty="0" err="1" smtClean="0">
+              <a:rPr lang="en-US" sz="1200" kern="1200" dirty="0" err="1">
                 <a:solidFill>
                   <a:schemeClr val="tx1"/>
                 </a:solidFill>
@@ -1546,7 +1548,7 @@
               <a:t>Rprofile</a:t>
             </a:r>
             <a:r>
-              <a:rPr lang="en-US" sz="1200" kern="1200" dirty="0" smtClean="0">
+              <a:rPr lang="en-US" sz="1200" kern="1200" dirty="0">
                 <a:solidFill>
                   <a:schemeClr val="tx1"/>
                 </a:solidFill>
@@ -1558,7 +1560,7 @@
               <a:t>, to use the legacy `</a:t>
             </a:r>
             <a:r>
-              <a:rPr lang="en-US" sz="1200" kern="1200" dirty="0" err="1" smtClean="0">
+              <a:rPr lang="en-US" sz="1200" kern="1200" dirty="0" err="1">
                 <a:solidFill>
                   <a:schemeClr val="tx1"/>
                 </a:solidFill>
@@ -1570,7 +1572,7 @@
               <a:t>api_key</a:t>
             </a:r>
             <a:r>
-              <a:rPr lang="en-US" sz="1200" kern="1200" dirty="0" smtClean="0">
+              <a:rPr lang="en-US" sz="1200" kern="1200" dirty="0">
                 <a:solidFill>
                   <a:schemeClr val="tx1"/>
                 </a:solidFill>
@@ -1666,7 +1668,7 @@
           <a:lstStyle/>
           <a:p>
             <a:r>
-              <a:rPr lang="en-US" dirty="0" smtClean="0">
+              <a:rPr lang="en-US" dirty="0">
                 <a:hlinkClick r:id="rId3"/>
               </a:rPr>
               <a:t>https://github.com/rladies/meetupr</a:t>
@@ -1756,11 +1758,11 @@
           <a:lstStyle/>
           <a:p>
             <a:r>
-              <a:rPr lang="en-US" dirty="0" smtClean="0"/>
+              <a:rPr lang="en-US" dirty="0"/>
               <a:t>As of sometime in 2019, </a:t>
             </a:r>
             <a:r>
-              <a:rPr lang="en-US" sz="1200" b="0" i="0" kern="1200" dirty="0" smtClean="0">
+              <a:rPr lang="en-US" sz="1200" b="0" i="0" kern="1200" dirty="0">
                 <a:solidFill>
                   <a:schemeClr val="tx1"/>
                 </a:solidFill>
@@ -1772,7 +1774,7 @@
               <a:t>The Meetup API provides support for </a:t>
             </a:r>
             <a:r>
-              <a:rPr lang="en-US" sz="1200" b="0" i="0" u="none" strike="noStrike" kern="1200" dirty="0" smtClean="0">
+              <a:rPr lang="en-US" sz="1200" b="0" i="0" u="none" strike="noStrike" kern="1200" dirty="0">
                 <a:solidFill>
                   <a:schemeClr val="tx1"/>
                 </a:solidFill>
@@ -1785,7 +1787,7 @@
               <a:t>OAuth 2</a:t>
             </a:r>
             <a:r>
-              <a:rPr lang="en-US" sz="1200" b="0" i="0" kern="1200" dirty="0" smtClean="0">
+              <a:rPr lang="en-US" sz="1200" b="0" i="0" kern="1200" dirty="0">
                 <a:solidFill>
                   <a:schemeClr val="tx1"/>
                 </a:solidFill>
@@ -1797,7 +1799,7 @@
               <a:t>. </a:t>
             </a:r>
             <a:r>
-              <a:rPr lang="en-US" sz="1200" b="0" i="0" kern="1200" baseline="0" dirty="0" smtClean="0">
+              <a:rPr lang="en-US" sz="1200" b="0" i="0" kern="1200" baseline="0" dirty="0">
                 <a:solidFill>
                   <a:schemeClr val="tx1"/>
                 </a:solidFill>
@@ -1809,22 +1811,21 @@
               <a:t> </a:t>
             </a:r>
             <a:r>
-              <a:rPr lang="en-US" dirty="0" smtClean="0"/>
+              <a:rPr lang="en-US" dirty="0"/>
               <a:t>First </a:t>
             </a:r>
             <a:r>
-              <a:rPr lang="en-US" dirty="0" err="1" smtClean="0"/>
+              <a:rPr lang="en-US" dirty="0" err="1"/>
               <a:t>Meetupr</a:t>
             </a:r>
             <a:r>
-              <a:rPr lang="en-US" baseline="0" dirty="0" smtClean="0"/>
+              <a:rPr lang="en-US" baseline="0" dirty="0"/>
               <a:t> usage: </a:t>
             </a:r>
             <a:r>
-              <a:rPr lang="en-US" dirty="0" smtClean="0"/>
+              <a:rPr lang="en-US" dirty="0"/>
               <a:t>Authentication complete. Please close this page and return to R.</a:t>
             </a:r>
-            <a:endParaRPr lang="en-US" dirty="0"/>
           </a:p>
         </p:txBody>
       </p:sp>
@@ -1909,65 +1910,61 @@
           <a:lstStyle/>
           <a:p>
             <a:r>
-              <a:rPr lang="en-US" dirty="0" smtClean="0"/>
+              <a:rPr lang="en-US" dirty="0"/>
               <a:t>First </a:t>
             </a:r>
             <a:r>
-              <a:rPr lang="en-US" dirty="0" err="1" smtClean="0"/>
+              <a:rPr lang="en-US" dirty="0" err="1"/>
               <a:t>Meetupr</a:t>
             </a:r>
             <a:r>
-              <a:rPr lang="en-US" baseline="0" dirty="0" smtClean="0"/>
+              <a:rPr lang="en-US" baseline="0" dirty="0"/>
               <a:t> usage: </a:t>
             </a:r>
             <a:r>
-              <a:rPr lang="en-US" dirty="0" smtClean="0"/>
-              <a:t>Authentication complete. Please close this page and return to R</a:t>
-            </a:r>
-            <a:r>
-              <a:rPr lang="en-US" dirty="0" smtClean="0"/>
-              <a:t>.</a:t>
-            </a:r>
-          </a:p>
-          <a:p>
-            <a:r>
-              <a:rPr lang="en-US" dirty="0" smtClean="0"/>
+              <a:rPr lang="en-US" dirty="0"/>
+              <a:t>Authentication complete. Please close this page and return to R.</a:t>
+            </a:r>
+          </a:p>
+          <a:p>
+            <a:r>
+              <a:rPr lang="en-US" dirty="0"/>
               <a:t>I thought I was nearly ready.</a:t>
             </a:r>
             <a:r>
-              <a:rPr lang="en-US" baseline="0" dirty="0" smtClean="0"/>
+              <a:rPr lang="en-US" baseline="0" dirty="0"/>
               <a:t> I had the Research Triangle Analysts animation and experienced this error with the </a:t>
             </a:r>
             <a:r>
-              <a:rPr lang="en-US" baseline="0" dirty="0" err="1" smtClean="0"/>
+              <a:rPr lang="en-US" baseline="0" dirty="0" err="1"/>
               <a:t>TriPASS</a:t>
             </a:r>
             <a:r>
-              <a:rPr lang="en-US" baseline="0" dirty="0" smtClean="0"/>
+              <a:rPr lang="en-US" baseline="0" dirty="0"/>
               <a:t>. Data. I increased the delay between 5-event downloads thinking that a long enough delay, that is – sufficient patience, would yield a successful download. Then I would create a few examples of conditional formatting in Excel using the </a:t>
             </a:r>
             <a:r>
-              <a:rPr lang="en-US" baseline="0" dirty="0" err="1" smtClean="0"/>
+              <a:rPr lang="en-US" baseline="0" dirty="0" err="1"/>
               <a:t>openxlsx</a:t>
             </a:r>
             <a:r>
-              <a:rPr lang="en-US" baseline="0" dirty="0" smtClean="0"/>
+              <a:rPr lang="en-US" baseline="0" dirty="0"/>
               <a:t> package, which I do at work sometimes and analyze the RTA and </a:t>
             </a:r>
             <a:r>
-              <a:rPr lang="en-US" baseline="0" dirty="0" err="1" smtClean="0"/>
+              <a:rPr lang="en-US" baseline="0" dirty="0" err="1"/>
               <a:t>TriPASS</a:t>
             </a:r>
             <a:r>
-              <a:rPr lang="en-US" baseline="0" dirty="0" smtClean="0"/>
+              <a:rPr lang="en-US" baseline="0" dirty="0"/>
               <a:t> data in a few ways that included at least one use of fellow Research Triangle Analyst board member, Ian D Cook’s, </a:t>
             </a:r>
             <a:r>
-              <a:rPr lang="en-US" baseline="0" dirty="0" err="1" smtClean="0"/>
+              <a:rPr lang="en-US" baseline="0" dirty="0" err="1"/>
               <a:t>tidyquery</a:t>
             </a:r>
             <a:r>
-              <a:rPr lang="en-US" baseline="0" dirty="0" smtClean="0"/>
+              <a:rPr lang="en-US" baseline="0" dirty="0"/>
               <a:t> package.</a:t>
             </a:r>
             <a:endParaRPr lang="en-US" dirty="0"/>
@@ -2139,22 +2136,21 @@
           <a:lstStyle/>
           <a:p>
             <a:r>
-              <a:rPr lang="en-US" dirty="0" smtClean="0"/>
+              <a:rPr lang="en-US" dirty="0"/>
               <a:t>First </a:t>
             </a:r>
             <a:r>
-              <a:rPr lang="en-US" dirty="0" err="1" smtClean="0"/>
+              <a:rPr lang="en-US" dirty="0" err="1"/>
               <a:t>Meetupr</a:t>
             </a:r>
             <a:r>
-              <a:rPr lang="en-US" baseline="0" dirty="0" smtClean="0"/>
+              <a:rPr lang="en-US" baseline="0" dirty="0"/>
               <a:t> usage: </a:t>
             </a:r>
             <a:r>
-              <a:rPr lang="en-US" dirty="0" smtClean="0"/>
+              <a:rPr lang="en-US" dirty="0"/>
               <a:t>Authentication complete. Please close this page and return to R.</a:t>
             </a:r>
-            <a:endParaRPr lang="en-US" dirty="0"/>
           </a:p>
         </p:txBody>
       </p:sp>
@@ -2239,22 +2235,21 @@
           <a:lstStyle/>
           <a:p>
             <a:r>
-              <a:rPr lang="en-US" dirty="0" smtClean="0"/>
+              <a:rPr lang="en-US" dirty="0"/>
               <a:t>First </a:t>
             </a:r>
             <a:r>
-              <a:rPr lang="en-US" dirty="0" err="1" smtClean="0"/>
+              <a:rPr lang="en-US" dirty="0" err="1"/>
               <a:t>Meetupr</a:t>
             </a:r>
             <a:r>
-              <a:rPr lang="en-US" baseline="0" dirty="0" smtClean="0"/>
+              <a:rPr lang="en-US" baseline="0" dirty="0"/>
               <a:t> usage: </a:t>
             </a:r>
             <a:r>
-              <a:rPr lang="en-US" dirty="0" smtClean="0"/>
+              <a:rPr lang="en-US" dirty="0"/>
               <a:t>Authentication complete. Please close this page and return to R.</a:t>
             </a:r>
-            <a:endParaRPr lang="en-US" dirty="0"/>
           </a:p>
         </p:txBody>
       </p:sp>
@@ -2339,10 +2334,9 @@
           <a:lstStyle/>
           <a:p>
             <a:r>
-              <a:rPr lang="en-US" dirty="0" smtClean="0"/>
+              <a:rPr lang="en-US" dirty="0"/>
               <a:t>Maybe skip backports</a:t>
             </a:r>
-            <a:endParaRPr lang="en-US" dirty="0"/>
           </a:p>
         </p:txBody>
       </p:sp>
@@ -2511,11 +2505,11 @@
           <a:lstStyle/>
           <a:p>
             <a:r>
-              <a:rPr lang="en-US" dirty="0" smtClean="0"/>
+              <a:rPr lang="en-US" dirty="0"/>
               <a:t>CTRL+SHIFT+B</a:t>
             </a:r>
             <a:r>
-              <a:rPr lang="en-US" baseline="0" dirty="0" smtClean="0"/>
+              <a:rPr lang="en-US" baseline="0" dirty="0"/>
               <a:t> to include this added line in the built package. And run.</a:t>
             </a:r>
             <a:endParaRPr lang="en-US" dirty="0"/>
@@ -2603,11 +2597,11 @@
           <a:lstStyle/>
           <a:p>
             <a:r>
-              <a:rPr lang="en-US" dirty="0" smtClean="0"/>
+              <a:rPr lang="en-US" dirty="0"/>
               <a:t>The Meetup API admitted</a:t>
             </a:r>
             <a:r>
-              <a:rPr lang="en-US" baseline="0" dirty="0" smtClean="0"/>
+              <a:rPr lang="en-US" baseline="0" dirty="0"/>
               <a:t> this event into the pool of past events and then rejected it.</a:t>
             </a:r>
             <a:endParaRPr lang="en-US" dirty="0"/>
@@ -2695,18 +2689,17 @@
           <a:lstStyle/>
           <a:p>
             <a:r>
-              <a:rPr lang="en-US" dirty="0" smtClean="0"/>
+              <a:rPr lang="en-US" dirty="0"/>
               <a:t>There are currently 22 Issues identified for </a:t>
             </a:r>
             <a:r>
-              <a:rPr lang="en-US" dirty="0" err="1" smtClean="0"/>
+              <a:rPr lang="en-US" dirty="0" err="1"/>
               <a:t>meetupr</a:t>
             </a:r>
             <a:r>
-              <a:rPr lang="en-US" dirty="0" smtClean="0"/>
+              <a:rPr lang="en-US" dirty="0"/>
               <a:t>.</a:t>
             </a:r>
-            <a:endParaRPr lang="en-US" dirty="0"/>
           </a:p>
         </p:txBody>
       </p:sp>
@@ -2791,7 +2784,7 @@
           <a:lstStyle/>
           <a:p>
             <a:r>
-              <a:rPr lang="en-US" dirty="0" smtClean="0">
+              <a:rPr lang="en-US" dirty="0">
                 <a:hlinkClick r:id="rId3"/>
               </a:rPr>
               <a:t>https://www.youtube.com/watch?v=7F7iQdcV8RY</a:t>
@@ -2827,6 +2820,567 @@
     <p:extLst>
       <p:ext uri="{BB962C8B-B14F-4D97-AF65-F5344CB8AC3E}">
         <p14:creationId xmlns:p14="http://schemas.microsoft.com/office/powerpoint/2010/main" val="1447297264"/>
+      </p:ext>
+    </p:extLst>
+  </p:cSld>
+  <p:clrMapOvr>
+    <a:masterClrMapping/>
+  </p:clrMapOvr>
+</p:notes>
+</file>
+
+<file path=ppt/notesSlides/notesSlide30.xml><?xml version="1.0" encoding="utf-8"?>
+<p:notes xmlns:a="http://schemas.openxmlformats.org/drawingml/2006/main" xmlns:r="http://schemas.openxmlformats.org/officeDocument/2006/relationships" xmlns:p="http://schemas.openxmlformats.org/presentationml/2006/main">
+  <p:cSld>
+    <p:spTree>
+      <p:nvGrpSpPr>
+        <p:cNvPr id="1" name=""/>
+        <p:cNvGrpSpPr/>
+        <p:nvPr/>
+      </p:nvGrpSpPr>
+      <p:grpSpPr>
+        <a:xfrm>
+          <a:off x="0" y="0"/>
+          <a:ext cx="0" cy="0"/>
+          <a:chOff x="0" y="0"/>
+          <a:chExt cx="0" cy="0"/>
+        </a:xfrm>
+      </p:grpSpPr>
+      <p:sp>
+        <p:nvSpPr>
+          <p:cNvPr id="2" name="Slide Image Placeholder 1"/>
+          <p:cNvSpPr>
+            <a:spLocks noGrp="1" noRot="1" noChangeAspect="1"/>
+          </p:cNvSpPr>
+          <p:nvPr>
+            <p:ph type="sldImg"/>
+          </p:nvPr>
+        </p:nvSpPr>
+        <p:spPr/>
+      </p:sp>
+      <p:sp>
+        <p:nvSpPr>
+          <p:cNvPr id="3" name="Notes Placeholder 2"/>
+          <p:cNvSpPr>
+            <a:spLocks noGrp="1"/>
+          </p:cNvSpPr>
+          <p:nvPr>
+            <p:ph type="body" idx="1"/>
+          </p:nvPr>
+        </p:nvSpPr>
+        <p:spPr/>
+        <p:txBody>
+          <a:bodyPr/>
+          <a:lstStyle/>
+          <a:p>
+            <a:r>
+              <a:rPr lang="en-US" dirty="0"/>
+              <a:t>There are currently 22 Issues identified for </a:t>
+            </a:r>
+            <a:r>
+              <a:rPr lang="en-US" dirty="0" err="1"/>
+              <a:t>meetupr</a:t>
+            </a:r>
+            <a:r>
+              <a:rPr lang="en-US" dirty="0"/>
+              <a:t>.</a:t>
+            </a:r>
+          </a:p>
+        </p:txBody>
+      </p:sp>
+      <p:sp>
+        <p:nvSpPr>
+          <p:cNvPr id="4" name="Slide Number Placeholder 3"/>
+          <p:cNvSpPr>
+            <a:spLocks noGrp="1"/>
+          </p:cNvSpPr>
+          <p:nvPr>
+            <p:ph type="sldNum" sz="quarter" idx="10"/>
+          </p:nvPr>
+        </p:nvSpPr>
+        <p:spPr/>
+        <p:txBody>
+          <a:bodyPr/>
+          <a:lstStyle/>
+          <a:p>
+            <a:fld id="{5C068675-1964-4363-A3A9-6BEF18DCB5DD}" type="slidenum">
+              <a:rPr lang="en-US" smtClean="0"/>
+              <a:t>36</a:t>
+            </a:fld>
+            <a:endParaRPr lang="en-US"/>
+          </a:p>
+        </p:txBody>
+      </p:sp>
+    </p:spTree>
+    <p:extLst>
+      <p:ext uri="{BB962C8B-B14F-4D97-AF65-F5344CB8AC3E}">
+        <p14:creationId xmlns:p14="http://schemas.microsoft.com/office/powerpoint/2010/main" val="3073120715"/>
+      </p:ext>
+    </p:extLst>
+  </p:cSld>
+  <p:clrMapOvr>
+    <a:masterClrMapping/>
+  </p:clrMapOvr>
+</p:notes>
+</file>
+
+<file path=ppt/notesSlides/notesSlide31.xml><?xml version="1.0" encoding="utf-8"?>
+<p:notes xmlns:a="http://schemas.openxmlformats.org/drawingml/2006/main" xmlns:r="http://schemas.openxmlformats.org/officeDocument/2006/relationships" xmlns:p="http://schemas.openxmlformats.org/presentationml/2006/main">
+  <p:cSld>
+    <p:spTree>
+      <p:nvGrpSpPr>
+        <p:cNvPr id="1" name=""/>
+        <p:cNvGrpSpPr/>
+        <p:nvPr/>
+      </p:nvGrpSpPr>
+      <p:grpSpPr>
+        <a:xfrm>
+          <a:off x="0" y="0"/>
+          <a:ext cx="0" cy="0"/>
+          <a:chOff x="0" y="0"/>
+          <a:chExt cx="0" cy="0"/>
+        </a:xfrm>
+      </p:grpSpPr>
+      <p:sp>
+        <p:nvSpPr>
+          <p:cNvPr id="2" name="Slide Image Placeholder 1"/>
+          <p:cNvSpPr>
+            <a:spLocks noGrp="1" noRot="1" noChangeAspect="1"/>
+          </p:cNvSpPr>
+          <p:nvPr>
+            <p:ph type="sldImg"/>
+          </p:nvPr>
+        </p:nvSpPr>
+        <p:spPr/>
+      </p:sp>
+      <p:sp>
+        <p:nvSpPr>
+          <p:cNvPr id="3" name="Notes Placeholder 2"/>
+          <p:cNvSpPr>
+            <a:spLocks noGrp="1"/>
+          </p:cNvSpPr>
+          <p:nvPr>
+            <p:ph type="body" idx="1"/>
+          </p:nvPr>
+        </p:nvSpPr>
+        <p:spPr/>
+        <p:txBody>
+          <a:bodyPr/>
+          <a:lstStyle/>
+          <a:p>
+            <a:r>
+              <a:rPr lang="en-US" dirty="0"/>
+              <a:t>There are currently 22 Issues identified for </a:t>
+            </a:r>
+            <a:r>
+              <a:rPr lang="en-US" dirty="0" err="1"/>
+              <a:t>meetupr</a:t>
+            </a:r>
+            <a:r>
+              <a:rPr lang="en-US" dirty="0"/>
+              <a:t>.</a:t>
+            </a:r>
+          </a:p>
+        </p:txBody>
+      </p:sp>
+      <p:sp>
+        <p:nvSpPr>
+          <p:cNvPr id="4" name="Slide Number Placeholder 3"/>
+          <p:cNvSpPr>
+            <a:spLocks noGrp="1"/>
+          </p:cNvSpPr>
+          <p:nvPr>
+            <p:ph type="sldNum" sz="quarter" idx="10"/>
+          </p:nvPr>
+        </p:nvSpPr>
+        <p:spPr/>
+        <p:txBody>
+          <a:bodyPr/>
+          <a:lstStyle/>
+          <a:p>
+            <a:fld id="{5C068675-1964-4363-A3A9-6BEF18DCB5DD}" type="slidenum">
+              <a:rPr lang="en-US" smtClean="0"/>
+              <a:t>37</a:t>
+            </a:fld>
+            <a:endParaRPr lang="en-US"/>
+          </a:p>
+        </p:txBody>
+      </p:sp>
+    </p:spTree>
+    <p:extLst>
+      <p:ext uri="{BB962C8B-B14F-4D97-AF65-F5344CB8AC3E}">
+        <p14:creationId xmlns:p14="http://schemas.microsoft.com/office/powerpoint/2010/main" val="2362765805"/>
+      </p:ext>
+    </p:extLst>
+  </p:cSld>
+  <p:clrMapOvr>
+    <a:masterClrMapping/>
+  </p:clrMapOvr>
+</p:notes>
+</file>
+
+<file path=ppt/notesSlides/notesSlide32.xml><?xml version="1.0" encoding="utf-8"?>
+<p:notes xmlns:a="http://schemas.openxmlformats.org/drawingml/2006/main" xmlns:r="http://schemas.openxmlformats.org/officeDocument/2006/relationships" xmlns:p="http://schemas.openxmlformats.org/presentationml/2006/main">
+  <p:cSld>
+    <p:spTree>
+      <p:nvGrpSpPr>
+        <p:cNvPr id="1" name=""/>
+        <p:cNvGrpSpPr/>
+        <p:nvPr/>
+      </p:nvGrpSpPr>
+      <p:grpSpPr>
+        <a:xfrm>
+          <a:off x="0" y="0"/>
+          <a:ext cx="0" cy="0"/>
+          <a:chOff x="0" y="0"/>
+          <a:chExt cx="0" cy="0"/>
+        </a:xfrm>
+      </p:grpSpPr>
+      <p:sp>
+        <p:nvSpPr>
+          <p:cNvPr id="2" name="Slide Image Placeholder 1"/>
+          <p:cNvSpPr>
+            <a:spLocks noGrp="1" noRot="1" noChangeAspect="1"/>
+          </p:cNvSpPr>
+          <p:nvPr>
+            <p:ph type="sldImg"/>
+          </p:nvPr>
+        </p:nvSpPr>
+        <p:spPr/>
+      </p:sp>
+      <p:sp>
+        <p:nvSpPr>
+          <p:cNvPr id="3" name="Notes Placeholder 2"/>
+          <p:cNvSpPr>
+            <a:spLocks noGrp="1"/>
+          </p:cNvSpPr>
+          <p:nvPr>
+            <p:ph type="body" idx="1"/>
+          </p:nvPr>
+        </p:nvSpPr>
+        <p:spPr/>
+        <p:txBody>
+          <a:bodyPr/>
+          <a:lstStyle/>
+          <a:p>
+            <a:r>
+              <a:rPr lang="en-US" dirty="0">
+                <a:hlinkClick r:id="rId3"/>
+              </a:rPr>
+              <a:t>https://cran.r-project.org/bin/windows/Rtools/</a:t>
+            </a:r>
+            <a:endParaRPr lang="en-US" dirty="0"/>
+          </a:p>
+          <a:p>
+            <a:endParaRPr lang="en-US" dirty="0"/>
+          </a:p>
+        </p:txBody>
+      </p:sp>
+      <p:sp>
+        <p:nvSpPr>
+          <p:cNvPr id="4" name="Slide Number Placeholder 3"/>
+          <p:cNvSpPr>
+            <a:spLocks noGrp="1"/>
+          </p:cNvSpPr>
+          <p:nvPr>
+            <p:ph type="sldNum" sz="quarter" idx="10"/>
+          </p:nvPr>
+        </p:nvSpPr>
+        <p:spPr/>
+        <p:txBody>
+          <a:bodyPr/>
+          <a:lstStyle/>
+          <a:p>
+            <a:fld id="{5C068675-1964-4363-A3A9-6BEF18DCB5DD}" type="slidenum">
+              <a:rPr lang="en-US" smtClean="0"/>
+              <a:t>38</a:t>
+            </a:fld>
+            <a:endParaRPr lang="en-US"/>
+          </a:p>
+        </p:txBody>
+      </p:sp>
+    </p:spTree>
+    <p:extLst>
+      <p:ext uri="{BB962C8B-B14F-4D97-AF65-F5344CB8AC3E}">
+        <p14:creationId xmlns:p14="http://schemas.microsoft.com/office/powerpoint/2010/main" val="2237534967"/>
+      </p:ext>
+    </p:extLst>
+  </p:cSld>
+  <p:clrMapOvr>
+    <a:masterClrMapping/>
+  </p:clrMapOvr>
+</p:notes>
+</file>
+
+<file path=ppt/notesSlides/notesSlide33.xml><?xml version="1.0" encoding="utf-8"?>
+<p:notes xmlns:a="http://schemas.openxmlformats.org/drawingml/2006/main" xmlns:r="http://schemas.openxmlformats.org/officeDocument/2006/relationships" xmlns:p="http://schemas.openxmlformats.org/presentationml/2006/main">
+  <p:cSld>
+    <p:spTree>
+      <p:nvGrpSpPr>
+        <p:cNvPr id="1" name=""/>
+        <p:cNvGrpSpPr/>
+        <p:nvPr/>
+      </p:nvGrpSpPr>
+      <p:grpSpPr>
+        <a:xfrm>
+          <a:off x="0" y="0"/>
+          <a:ext cx="0" cy="0"/>
+          <a:chOff x="0" y="0"/>
+          <a:chExt cx="0" cy="0"/>
+        </a:xfrm>
+      </p:grpSpPr>
+      <p:sp>
+        <p:nvSpPr>
+          <p:cNvPr id="2" name="Slide Image Placeholder 1"/>
+          <p:cNvSpPr>
+            <a:spLocks noGrp="1" noRot="1" noChangeAspect="1"/>
+          </p:cNvSpPr>
+          <p:nvPr>
+            <p:ph type="sldImg"/>
+          </p:nvPr>
+        </p:nvSpPr>
+        <p:spPr/>
+      </p:sp>
+      <p:sp>
+        <p:nvSpPr>
+          <p:cNvPr id="3" name="Notes Placeholder 2"/>
+          <p:cNvSpPr>
+            <a:spLocks noGrp="1"/>
+          </p:cNvSpPr>
+          <p:nvPr>
+            <p:ph type="body" idx="1"/>
+          </p:nvPr>
+        </p:nvSpPr>
+        <p:spPr/>
+        <p:txBody>
+          <a:bodyPr/>
+          <a:lstStyle/>
+          <a:p>
+            <a:r>
+              <a:rPr lang="en-US" dirty="0">
+                <a:hlinkClick r:id="rId3"/>
+              </a:rPr>
+              <a:t>https://cran.r-project.org/bin/windows/Rtools/</a:t>
+            </a:r>
+            <a:endParaRPr lang="en-US" dirty="0"/>
+          </a:p>
+          <a:p>
+            <a:endParaRPr lang="en-US" dirty="0"/>
+          </a:p>
+        </p:txBody>
+      </p:sp>
+      <p:sp>
+        <p:nvSpPr>
+          <p:cNvPr id="4" name="Slide Number Placeholder 3"/>
+          <p:cNvSpPr>
+            <a:spLocks noGrp="1"/>
+          </p:cNvSpPr>
+          <p:nvPr>
+            <p:ph type="sldNum" sz="quarter" idx="10"/>
+          </p:nvPr>
+        </p:nvSpPr>
+        <p:spPr/>
+        <p:txBody>
+          <a:bodyPr/>
+          <a:lstStyle/>
+          <a:p>
+            <a:fld id="{5C068675-1964-4363-A3A9-6BEF18DCB5DD}" type="slidenum">
+              <a:rPr lang="en-US" smtClean="0"/>
+              <a:t>39</a:t>
+            </a:fld>
+            <a:endParaRPr lang="en-US"/>
+          </a:p>
+        </p:txBody>
+      </p:sp>
+    </p:spTree>
+    <p:extLst>
+      <p:ext uri="{BB962C8B-B14F-4D97-AF65-F5344CB8AC3E}">
+        <p14:creationId xmlns:p14="http://schemas.microsoft.com/office/powerpoint/2010/main" val="2502396737"/>
+      </p:ext>
+    </p:extLst>
+  </p:cSld>
+  <p:clrMapOvr>
+    <a:masterClrMapping/>
+  </p:clrMapOvr>
+</p:notes>
+</file>
+
+<file path=ppt/notesSlides/notesSlide34.xml><?xml version="1.0" encoding="utf-8"?>
+<p:notes xmlns:a="http://schemas.openxmlformats.org/drawingml/2006/main" xmlns:r="http://schemas.openxmlformats.org/officeDocument/2006/relationships" xmlns:p="http://schemas.openxmlformats.org/presentationml/2006/main">
+  <p:cSld>
+    <p:spTree>
+      <p:nvGrpSpPr>
+        <p:cNvPr id="1" name=""/>
+        <p:cNvGrpSpPr/>
+        <p:nvPr/>
+      </p:nvGrpSpPr>
+      <p:grpSpPr>
+        <a:xfrm>
+          <a:off x="0" y="0"/>
+          <a:ext cx="0" cy="0"/>
+          <a:chOff x="0" y="0"/>
+          <a:chExt cx="0" cy="0"/>
+        </a:xfrm>
+      </p:grpSpPr>
+      <p:sp>
+        <p:nvSpPr>
+          <p:cNvPr id="2" name="Slide Image Placeholder 1"/>
+          <p:cNvSpPr>
+            <a:spLocks noGrp="1" noRot="1" noChangeAspect="1"/>
+          </p:cNvSpPr>
+          <p:nvPr>
+            <p:ph type="sldImg"/>
+          </p:nvPr>
+        </p:nvSpPr>
+        <p:spPr/>
+      </p:sp>
+      <p:sp>
+        <p:nvSpPr>
+          <p:cNvPr id="3" name="Notes Placeholder 2"/>
+          <p:cNvSpPr>
+            <a:spLocks noGrp="1"/>
+          </p:cNvSpPr>
+          <p:nvPr>
+            <p:ph type="body" idx="1"/>
+          </p:nvPr>
+        </p:nvSpPr>
+        <p:spPr/>
+        <p:txBody>
+          <a:bodyPr/>
+          <a:lstStyle/>
+          <a:p>
+            <a:r>
+              <a:rPr lang="en-US" dirty="0">
+                <a:hlinkClick r:id="rId3"/>
+              </a:rPr>
+              <a:t>https://cran.r-project.org/bin/windows/Rtools/</a:t>
+            </a:r>
+            <a:endParaRPr lang="en-US" dirty="0"/>
+          </a:p>
+          <a:p>
+            <a:endParaRPr lang="en-US" dirty="0"/>
+          </a:p>
+        </p:txBody>
+      </p:sp>
+      <p:sp>
+        <p:nvSpPr>
+          <p:cNvPr id="4" name="Slide Number Placeholder 3"/>
+          <p:cNvSpPr>
+            <a:spLocks noGrp="1"/>
+          </p:cNvSpPr>
+          <p:nvPr>
+            <p:ph type="sldNum" sz="quarter" idx="10"/>
+          </p:nvPr>
+        </p:nvSpPr>
+        <p:spPr/>
+        <p:txBody>
+          <a:bodyPr/>
+          <a:lstStyle/>
+          <a:p>
+            <a:fld id="{5C068675-1964-4363-A3A9-6BEF18DCB5DD}" type="slidenum">
+              <a:rPr lang="en-US" smtClean="0"/>
+              <a:t>40</a:t>
+            </a:fld>
+            <a:endParaRPr lang="en-US"/>
+          </a:p>
+        </p:txBody>
+      </p:sp>
+    </p:spTree>
+    <p:extLst>
+      <p:ext uri="{BB962C8B-B14F-4D97-AF65-F5344CB8AC3E}">
+        <p14:creationId xmlns:p14="http://schemas.microsoft.com/office/powerpoint/2010/main" val="769766731"/>
+      </p:ext>
+    </p:extLst>
+  </p:cSld>
+  <p:clrMapOvr>
+    <a:masterClrMapping/>
+  </p:clrMapOvr>
+</p:notes>
+</file>
+
+<file path=ppt/notesSlides/notesSlide35.xml><?xml version="1.0" encoding="utf-8"?>
+<p:notes xmlns:a="http://schemas.openxmlformats.org/drawingml/2006/main" xmlns:r="http://schemas.openxmlformats.org/officeDocument/2006/relationships" xmlns:p="http://schemas.openxmlformats.org/presentationml/2006/main">
+  <p:cSld>
+    <p:spTree>
+      <p:nvGrpSpPr>
+        <p:cNvPr id="1" name=""/>
+        <p:cNvGrpSpPr/>
+        <p:nvPr/>
+      </p:nvGrpSpPr>
+      <p:grpSpPr>
+        <a:xfrm>
+          <a:off x="0" y="0"/>
+          <a:ext cx="0" cy="0"/>
+          <a:chOff x="0" y="0"/>
+          <a:chExt cx="0" cy="0"/>
+        </a:xfrm>
+      </p:grpSpPr>
+      <p:sp>
+        <p:nvSpPr>
+          <p:cNvPr id="2" name="Slide Image Placeholder 1"/>
+          <p:cNvSpPr>
+            <a:spLocks noGrp="1" noRot="1" noChangeAspect="1"/>
+          </p:cNvSpPr>
+          <p:nvPr>
+            <p:ph type="sldImg"/>
+          </p:nvPr>
+        </p:nvSpPr>
+        <p:spPr/>
+      </p:sp>
+      <p:sp>
+        <p:nvSpPr>
+          <p:cNvPr id="3" name="Notes Placeholder 2"/>
+          <p:cNvSpPr>
+            <a:spLocks noGrp="1"/>
+          </p:cNvSpPr>
+          <p:nvPr>
+            <p:ph type="body" idx="1"/>
+          </p:nvPr>
+        </p:nvSpPr>
+        <p:spPr/>
+        <p:txBody>
+          <a:bodyPr/>
+          <a:lstStyle/>
+          <a:p>
+            <a:r>
+              <a:rPr lang="en-US" dirty="0"/>
+              <a:t>The Meetup API admitted</a:t>
+            </a:r>
+            <a:r>
+              <a:rPr lang="en-US" baseline="0" dirty="0"/>
+              <a:t> this event into the pool of past events and then rejected it.</a:t>
+            </a:r>
+            <a:endParaRPr lang="en-US" dirty="0"/>
+          </a:p>
+        </p:txBody>
+      </p:sp>
+      <p:sp>
+        <p:nvSpPr>
+          <p:cNvPr id="4" name="Slide Number Placeholder 3"/>
+          <p:cNvSpPr>
+            <a:spLocks noGrp="1"/>
+          </p:cNvSpPr>
+          <p:nvPr>
+            <p:ph type="sldNum" sz="quarter" idx="10"/>
+          </p:nvPr>
+        </p:nvSpPr>
+        <p:spPr/>
+        <p:txBody>
+          <a:bodyPr/>
+          <a:lstStyle/>
+          <a:p>
+            <a:fld id="{5C068675-1964-4363-A3A9-6BEF18DCB5DD}" type="slidenum">
+              <a:rPr lang="en-US" smtClean="0"/>
+              <a:t>41</a:t>
+            </a:fld>
+            <a:endParaRPr lang="en-US"/>
+          </a:p>
+        </p:txBody>
+      </p:sp>
+    </p:spTree>
+    <p:extLst>
+      <p:ext uri="{BB962C8B-B14F-4D97-AF65-F5344CB8AC3E}">
+        <p14:creationId xmlns:p14="http://schemas.microsoft.com/office/powerpoint/2010/main" val="116365389"/>
       </p:ext>
     </p:extLst>
   </p:cSld>
@@ -2881,7 +3435,7 @@
           <a:lstStyle/>
           <a:p>
             <a:r>
-              <a:rPr lang="en-US" dirty="0" smtClean="0">
+              <a:rPr lang="en-US" dirty="0">
                 <a:hlinkClick r:id="rId3"/>
               </a:rPr>
               <a:t>https://www.youtube.com/watch?v=7F7iQdcV8RY</a:t>
@@ -2971,7 +3525,7 @@
           <a:lstStyle/>
           <a:p>
             <a:r>
-              <a:rPr lang="en-US" sz="1200" b="0" i="0" kern="1200" dirty="0" smtClean="0">
+              <a:rPr lang="en-US" sz="1200" b="0" i="0" kern="1200" dirty="0">
                 <a:solidFill>
                   <a:schemeClr val="tx1"/>
                 </a:solidFill>
@@ -3625,7 +4179,7 @@
           <a:p>
             <a:fld id="{926B5D0B-86BF-47C9-8AF9-0055D370667A}" type="datetimeFigureOut">
               <a:rPr lang="en-US" smtClean="0"/>
-              <a:t>7/20/2020</a:t>
+              <a:t>7/21/2020</a:t>
             </a:fld>
             <a:endParaRPr lang="en-US"/>
           </a:p>
@@ -3823,7 +4377,7 @@
           <a:p>
             <a:fld id="{926B5D0B-86BF-47C9-8AF9-0055D370667A}" type="datetimeFigureOut">
               <a:rPr lang="en-US" smtClean="0"/>
-              <a:t>7/20/2020</a:t>
+              <a:t>7/21/2020</a:t>
             </a:fld>
             <a:endParaRPr lang="en-US"/>
           </a:p>
@@ -4031,7 +4585,7 @@
           <a:p>
             <a:fld id="{926B5D0B-86BF-47C9-8AF9-0055D370667A}" type="datetimeFigureOut">
               <a:rPr lang="en-US" smtClean="0"/>
-              <a:t>7/20/2020</a:t>
+              <a:t>7/21/2020</a:t>
             </a:fld>
             <a:endParaRPr lang="en-US"/>
           </a:p>
@@ -4717,7 +5271,7 @@
           <a:p>
             <a:fld id="{926B5D0B-86BF-47C9-8AF9-0055D370667A}" type="datetimeFigureOut">
               <a:rPr lang="en-US" smtClean="0"/>
-              <a:t>7/20/2020</a:t>
+              <a:t>7/21/2020</a:t>
             </a:fld>
             <a:endParaRPr lang="en-US"/>
           </a:p>
@@ -4992,7 +5546,7 @@
           <a:p>
             <a:fld id="{926B5D0B-86BF-47C9-8AF9-0055D370667A}" type="datetimeFigureOut">
               <a:rPr lang="en-US" smtClean="0"/>
-              <a:t>7/20/2020</a:t>
+              <a:t>7/21/2020</a:t>
             </a:fld>
             <a:endParaRPr lang="en-US"/>
           </a:p>
@@ -5257,7 +5811,7 @@
           <a:p>
             <a:fld id="{926B5D0B-86BF-47C9-8AF9-0055D370667A}" type="datetimeFigureOut">
               <a:rPr lang="en-US" smtClean="0"/>
-              <a:t>7/20/2020</a:t>
+              <a:t>7/21/2020</a:t>
             </a:fld>
             <a:endParaRPr lang="en-US"/>
           </a:p>
@@ -5669,7 +6223,7 @@
           <a:p>
             <a:fld id="{926B5D0B-86BF-47C9-8AF9-0055D370667A}" type="datetimeFigureOut">
               <a:rPr lang="en-US" smtClean="0"/>
-              <a:t>7/20/2020</a:t>
+              <a:t>7/21/2020</a:t>
             </a:fld>
             <a:endParaRPr lang="en-US"/>
           </a:p>
@@ -5810,7 +6364,7 @@
           <a:p>
             <a:fld id="{926B5D0B-86BF-47C9-8AF9-0055D370667A}" type="datetimeFigureOut">
               <a:rPr lang="en-US" smtClean="0"/>
-              <a:t>7/20/2020</a:t>
+              <a:t>7/21/2020</a:t>
             </a:fld>
             <a:endParaRPr lang="en-US"/>
           </a:p>
@@ -5923,7 +6477,7 @@
           <a:p>
             <a:fld id="{926B5D0B-86BF-47C9-8AF9-0055D370667A}" type="datetimeFigureOut">
               <a:rPr lang="en-US" smtClean="0"/>
-              <a:t>7/20/2020</a:t>
+              <a:t>7/21/2020</a:t>
             </a:fld>
             <a:endParaRPr lang="en-US"/>
           </a:p>
@@ -6234,7 +6788,7 @@
           <a:p>
             <a:fld id="{926B5D0B-86BF-47C9-8AF9-0055D370667A}" type="datetimeFigureOut">
               <a:rPr lang="en-US" smtClean="0"/>
-              <a:t>7/20/2020</a:t>
+              <a:t>7/21/2020</a:t>
             </a:fld>
             <a:endParaRPr lang="en-US"/>
           </a:p>
@@ -6522,7 +7076,7 @@
           <a:p>
             <a:fld id="{926B5D0B-86BF-47C9-8AF9-0055D370667A}" type="datetimeFigureOut">
               <a:rPr lang="en-US" smtClean="0"/>
-              <a:t>7/20/2020</a:t>
+              <a:t>7/21/2020</a:t>
             </a:fld>
             <a:endParaRPr lang="en-US"/>
           </a:p>
@@ -6763,7 +7317,7 @@
           <a:p>
             <a:fld id="{926B5D0B-86BF-47C9-8AF9-0055D370667A}" type="datetimeFigureOut">
               <a:rPr lang="en-US" smtClean="0"/>
-              <a:t>7/20/2020</a:t>
+              <a:t>7/21/2020</a:t>
             </a:fld>
             <a:endParaRPr lang="en-US"/>
           </a:p>
@@ -7210,22 +7764,21 @@
           <a:lstStyle/>
           <a:p>
             <a:r>
-              <a:rPr lang="en-US" sz="3600" dirty="0" smtClean="0"/>
+              <a:rPr lang="en-US" sz="3600" dirty="0"/>
               <a:t>Rick Pack</a:t>
             </a:r>
           </a:p>
           <a:p>
             <a:r>
-              <a:rPr lang="en-US" sz="3600" dirty="0" smtClean="0"/>
+              <a:rPr lang="en-US" sz="3600" dirty="0"/>
               <a:t>Research Triangle Analysts</a:t>
             </a:r>
           </a:p>
           <a:p>
             <a:r>
-              <a:rPr lang="en-US" sz="3600" dirty="0" smtClean="0"/>
+              <a:rPr lang="en-US" sz="3600" dirty="0"/>
               <a:t>July 21, 2020</a:t>
             </a:r>
-            <a:endParaRPr lang="en-US" sz="3600" dirty="0"/>
           </a:p>
         </p:txBody>
       </p:sp>
@@ -7284,13 +7837,6 @@
   <p:clrMapOvr>
     <a:masterClrMapping/>
   </p:clrMapOvr>
-  <p:timing>
-    <p:tnLst>
-      <p:par>
-        <p:cTn id="1" dur="indefinite" restart="never" nodeType="tmRoot"/>
-      </p:par>
-    </p:tnLst>
-  </p:timing>
 </p:sld>
 </file>
 
@@ -7365,18 +7911,6 @@
               </a:rPr>
               <a:t>COVID-19</a:t>
             </a:r>
-            <a:r>
-              <a:rPr lang="en" sz="4800">
-                <a:solidFill>
-                  <a:srgbClr val="3D85C6"/>
-                </a:solidFill>
-                <a:latin typeface="Bree Serif"/>
-                <a:ea typeface="Bree Serif"/>
-                <a:cs typeface="Bree Serif"/>
-                <a:sym typeface="Bree Serif"/>
-              </a:rPr>
-              <a:t/>
-            </a:r>
             <a:br>
               <a:rPr lang="en" sz="4800">
                 <a:solidFill>
@@ -7517,13 +8051,6 @@
   <p:clrMapOvr>
     <a:masterClrMapping/>
   </p:clrMapOvr>
-  <p:timing>
-    <p:tnLst>
-      <p:par>
-        <p:cTn id="1" dur="indefinite" restart="never" nodeType="tmRoot"/>
-      </p:par>
-    </p:tnLst>
-  </p:timing>
 </p:sld>
 </file>
 
@@ -7732,13 +8259,6 @@
   <p:clrMapOvr>
     <a:masterClrMapping/>
   </p:clrMapOvr>
-  <p:timing>
-    <p:tnLst>
-      <p:par>
-        <p:cTn id="1" dur="indefinite" restart="never" nodeType="tmRoot"/>
-      </p:par>
-    </p:tnLst>
-  </p:timing>
 </p:sld>
 </file>
 
@@ -7791,7 +8311,7 @@
           <a:p>
             <a:pPr algn="ctr"/>
             <a:r>
-              <a:rPr lang="en-US" sz="4400" dirty="0" smtClean="0">
+              <a:rPr lang="en-US" sz="4400" dirty="0">
                 <a:solidFill>
                   <a:schemeClr val="accent1">
                     <a:lumMod val="75000"/>
@@ -7800,13 +8320,6 @@
               </a:rPr>
               <a:t>INITIAL GOALS</a:t>
             </a:r>
-            <a:endParaRPr lang="en-US" sz="4400" dirty="0">
-              <a:solidFill>
-                <a:schemeClr val="accent1">
-                  <a:lumMod val="75000"/>
-                </a:schemeClr>
-              </a:solidFill>
-            </a:endParaRPr>
           </a:p>
         </p:txBody>
       </p:sp>
@@ -7829,15 +8342,15 @@
               <a:buAutoNum type="arabicPeriod"/>
             </a:pPr>
             <a:r>
-              <a:rPr lang="en-US" dirty="0" smtClean="0"/>
+              <a:rPr lang="en-US" dirty="0"/>
               <a:t>Update </a:t>
             </a:r>
             <a:r>
-              <a:rPr lang="en-US" i="1" dirty="0" err="1" smtClean="0"/>
+              <a:rPr lang="en-US" i="1" dirty="0" err="1"/>
               <a:t>meetupr</a:t>
             </a:r>
             <a:r>
-              <a:rPr lang="en-US" dirty="0" smtClean="0"/>
+              <a:rPr lang="en-US" dirty="0"/>
               <a:t> R package so “joined date” is date when member joined the respective Meetup group, not Meetup.com</a:t>
             </a:r>
           </a:p>
@@ -7846,7 +8359,7 @@
               <a:buAutoNum type="arabicPeriod"/>
             </a:pPr>
             <a:r>
-              <a:rPr lang="en-US" dirty="0" smtClean="0"/>
+              <a:rPr lang="en-US" dirty="0"/>
               <a:t>Do all this stuff…</a:t>
             </a:r>
           </a:p>
@@ -7865,13 +8378,6 @@
   <p:clrMapOvr>
     <a:masterClrMapping/>
   </p:clrMapOvr>
-  <p:timing>
-    <p:tnLst>
-      <p:par>
-        <p:cTn id="1" dur="indefinite" restart="never" nodeType="tmRoot"/>
-      </p:par>
-    </p:tnLst>
-  </p:timing>
 </p:sld>
 </file>
 
@@ -7924,7 +8430,7 @@
           <a:p>
             <a:pPr algn="ctr"/>
             <a:r>
-              <a:rPr lang="en-US" sz="4400" dirty="0" smtClean="0">
+              <a:rPr lang="en-US" sz="4400" dirty="0">
                 <a:solidFill>
                   <a:schemeClr val="accent1">
                     <a:lumMod val="75000"/>
@@ -7933,13 +8439,6 @@
               </a:rPr>
               <a:t>INITIAL GOALS</a:t>
             </a:r>
-            <a:endParaRPr lang="en-US" sz="4400" dirty="0">
-              <a:solidFill>
-                <a:schemeClr val="accent1">
-                  <a:lumMod val="75000"/>
-                </a:schemeClr>
-              </a:solidFill>
-            </a:endParaRPr>
           </a:p>
         </p:txBody>
       </p:sp>
@@ -7996,13 +8495,6 @@
   <p:clrMapOvr>
     <a:masterClrMapping/>
   </p:clrMapOvr>
-  <p:timing>
-    <p:tnLst>
-      <p:par>
-        <p:cTn id="1" dur="indefinite" restart="never" nodeType="tmRoot"/>
-      </p:par>
-    </p:tnLst>
-  </p:timing>
 </p:sld>
 </file>
 
@@ -8055,7 +8547,7 @@
           <a:p>
             <a:pPr algn="ctr"/>
             <a:r>
-              <a:rPr lang="en-US" sz="4400" dirty="0" err="1" smtClean="0">
+              <a:rPr lang="en-US" sz="4400" dirty="0" err="1">
                 <a:solidFill>
                   <a:schemeClr val="accent1">
                     <a:lumMod val="75000"/>
@@ -8156,13 +8648,6 @@
   <p:clrMapOvr>
     <a:masterClrMapping/>
   </p:clrMapOvr>
-  <p:timing>
-    <p:tnLst>
-      <p:par>
-        <p:cTn id="1" dur="indefinite" restart="never" nodeType="tmRoot"/>
-      </p:par>
-    </p:tnLst>
-  </p:timing>
 </p:sld>
 </file>
 
@@ -8306,13 +8791,6 @@
   <p:clrMapOvr>
     <a:masterClrMapping/>
   </p:clrMapOvr>
-  <p:timing>
-    <p:tnLst>
-      <p:par>
-        <p:cTn id="1" dur="indefinite" restart="never" nodeType="tmRoot"/>
-      </p:par>
-    </p:tnLst>
-  </p:timing>
 </p:sld>
 </file>
 
@@ -8426,13 +8904,6 @@
   <p:clrMapOvr>
     <a:masterClrMapping/>
   </p:clrMapOvr>
-  <p:timing>
-    <p:tnLst>
-      <p:par>
-        <p:cTn id="1" dur="indefinite" restart="never" nodeType="tmRoot"/>
-      </p:par>
-    </p:tnLst>
-  </p:timing>
 </p:sld>
 </file>
 
@@ -8642,18 +9113,17 @@
               <a:buNone/>
             </a:pPr>
             <a:r>
-              <a:rPr lang="en-US" sz="3000" dirty="0" smtClean="0"/>
+              <a:rPr lang="en-US" sz="3000" dirty="0"/>
               <a:t>Update </a:t>
             </a:r>
             <a:r>
-              <a:rPr lang="en-US" sz="3000" i="1" dirty="0" err="1" smtClean="0"/>
+              <a:rPr lang="en-US" sz="3000" i="1" dirty="0" err="1"/>
               <a:t>meetupr</a:t>
             </a:r>
             <a:r>
-              <a:rPr lang="en-US" sz="3000" dirty="0" smtClean="0"/>
+              <a:rPr lang="en-US" sz="3000" dirty="0"/>
               <a:t> R package so “joined date” is date when member joined the respective Meetup group, not Meetup.com</a:t>
             </a:r>
-            <a:endParaRPr lang="en-US" sz="3000" dirty="0"/>
           </a:p>
         </p:txBody>
       </p:sp>
@@ -9328,13 +9798,6 @@
   <p:clrMapOvr>
     <a:masterClrMapping/>
   </p:clrMapOvr>
-  <p:timing>
-    <p:tnLst>
-      <p:par>
-        <p:cTn id="1" dur="indefinite" restart="never" nodeType="tmRoot"/>
-      </p:par>
-    </p:tnLst>
-  </p:timing>
 </p:sld>
 </file>
 
@@ -9387,7 +9850,7 @@
           <a:p>
             <a:pPr algn="ctr"/>
             <a:r>
-              <a:rPr lang="en-US" sz="4400" dirty="0" smtClean="0">
+              <a:rPr lang="en-US" sz="4400" dirty="0">
                 <a:solidFill>
                   <a:schemeClr val="accent1">
                     <a:lumMod val="75000"/>
@@ -9396,13 +9859,6 @@
               </a:rPr>
               <a:t>R Packages</a:t>
             </a:r>
-            <a:endParaRPr lang="en-US" sz="4400" dirty="0">
-              <a:solidFill>
-                <a:schemeClr val="accent1">
-                  <a:lumMod val="75000"/>
-                </a:schemeClr>
-              </a:solidFill>
-            </a:endParaRPr>
           </a:p>
         </p:txBody>
       </p:sp>
@@ -9427,15 +9883,6 @@
           </a:bodyPr>
           <a:lstStyle/>
           <a:p>
-            <a:r>
-              <a:rPr lang="en-US" sz="4000" dirty="0" smtClean="0">
-                <a:solidFill>
-                  <a:srgbClr val="333333"/>
-                </a:solidFill>
-                <a:latin typeface="libre baskerville"/>
-              </a:rPr>
-              <a:t>“Packages </a:t>
-            </a:r>
             <a:r>
               <a:rPr lang="en-US" sz="4000" dirty="0">
                 <a:solidFill>
@@ -9443,16 +9890,7 @@
                 </a:solidFill>
                 <a:latin typeface="libre baskerville"/>
               </a:rPr>
-              <a:t>are the fundamental concept of code reusability in R programming. A package in R is a collection of functions, sample data, and the documentation that describes how to use them</a:t>
-            </a:r>
-            <a:r>
-              <a:rPr lang="en-US" sz="4000" dirty="0" smtClean="0">
-                <a:solidFill>
-                  <a:srgbClr val="333333"/>
-                </a:solidFill>
-                <a:latin typeface="libre baskerville"/>
-              </a:rPr>
-              <a:t>.”</a:t>
+              <a:t>“Packages are the fundamental concept of code reusability in R programming. A package in R is a collection of functions, sample data, and the documentation that describes how to use them.”</a:t>
             </a:r>
             <a:endParaRPr lang="en-US" sz="4000" dirty="0"/>
           </a:p>
@@ -9492,13 +9930,6 @@
   <p:clrMapOvr>
     <a:masterClrMapping/>
   </p:clrMapOvr>
-  <p:timing>
-    <p:tnLst>
-      <p:par>
-        <p:cTn id="1" dur="indefinite" restart="never" nodeType="tmRoot"/>
-      </p:par>
-    </p:tnLst>
-  </p:timing>
 </p:sld>
 </file>
 
@@ -9654,13 +10085,6 @@
   <p:clrMapOvr>
     <a:masterClrMapping/>
   </p:clrMapOvr>
-  <p:timing>
-    <p:tnLst>
-      <p:par>
-        <p:cTn id="1" dur="indefinite" restart="never" nodeType="tmRoot"/>
-      </p:par>
-    </p:tnLst>
-  </p:timing>
 </p:sld>
 </file>
 
@@ -9837,7 +10261,7 @@
           <a:lstStyle/>
           <a:p>
             <a:r>
-              <a:rPr lang="en-US" sz="3000" dirty="0" smtClean="0"/>
+              <a:rPr lang="en-US" sz="3000" dirty="0"/>
               <a:t>May have to terminate R Studio and install in new instance of R GUI             -------------------------------------&gt;</a:t>
             </a:r>
           </a:p>
@@ -9870,7 +10294,7 @@
           <a:lstStyle/>
           <a:p>
             <a:r>
-              <a:rPr lang="en-US" sz="2800" dirty="0" err="1" smtClean="0">
+              <a:rPr lang="en-US" sz="2800" dirty="0" err="1">
                 <a:solidFill>
                   <a:schemeClr val="bg1"/>
                 </a:solidFill>
@@ -9880,7 +10304,7 @@
               <a:t>install.packages</a:t>
             </a:r>
             <a:r>
-              <a:rPr lang="en-US" sz="2800" dirty="0" smtClean="0">
+              <a:rPr lang="en-US" sz="2800" dirty="0">
                 <a:solidFill>
                   <a:schemeClr val="bg1"/>
                 </a:solidFill>
@@ -9890,7 +10314,7 @@
               <a:t>(‘</a:t>
             </a:r>
             <a:r>
-              <a:rPr lang="en-US" sz="2800" dirty="0" err="1" smtClean="0">
+              <a:rPr lang="en-US" sz="2800" dirty="0" err="1">
                 <a:solidFill>
                   <a:schemeClr val="bg1"/>
                 </a:solidFill>
@@ -9900,7 +10324,7 @@
               <a:t>vctrs</a:t>
             </a:r>
             <a:r>
-              <a:rPr lang="en-US" sz="2800" dirty="0" smtClean="0">
+              <a:rPr lang="en-US" sz="2800" dirty="0">
                 <a:solidFill>
                   <a:schemeClr val="bg1"/>
                 </a:solidFill>
@@ -9909,13 +10333,6 @@
               </a:rPr>
               <a:t>’)</a:t>
             </a:r>
-            <a:endParaRPr lang="en-US" sz="2800" dirty="0">
-              <a:solidFill>
-                <a:schemeClr val="bg1"/>
-              </a:solidFill>
-              <a:latin typeface="Courier New" panose="02070309020205020404" pitchFamily="49" charset="0"/>
-              <a:cs typeface="Courier New" panose="02070309020205020404" pitchFamily="49" charset="0"/>
-            </a:endParaRPr>
           </a:p>
         </p:txBody>
       </p:sp>
@@ -10006,10 +10423,9 @@
           <a:lstStyle/>
           <a:p>
             <a:r>
-              <a:rPr lang="en-US" sz="2800" dirty="0" smtClean="0"/>
+              <a:rPr lang="en-US" sz="2800" dirty="0"/>
               <a:t>Package Name</a:t>
             </a:r>
-            <a:endParaRPr lang="en-US" sz="2800" dirty="0"/>
           </a:p>
         </p:txBody>
       </p:sp>
@@ -10076,10 +10492,9 @@
           <a:lstStyle/>
           <a:p>
             <a:r>
-              <a:rPr lang="en-US" sz="2800" dirty="0" smtClean="0"/>
+              <a:rPr lang="en-US" sz="2800" dirty="0"/>
               <a:t>Package Function</a:t>
             </a:r>
-            <a:endParaRPr lang="en-US" sz="2800" dirty="0"/>
           </a:p>
         </p:txBody>
       </p:sp>
@@ -10093,13 +10508,6 @@
   <p:clrMapOvr>
     <a:masterClrMapping/>
   </p:clrMapOvr>
-  <p:timing>
-    <p:tnLst>
-      <p:par>
-        <p:cTn id="1" dur="indefinite" restart="never" nodeType="tmRoot"/>
-      </p:par>
-    </p:tnLst>
-  </p:timing>
 </p:sld>
 </file>
 
@@ -10244,7 +10652,7 @@
           <a:lstStyle/>
           <a:p>
             <a:r>
-              <a:rPr lang="en-US" sz="3800" b="1" dirty="0" smtClean="0">
+              <a:rPr lang="en-US" sz="3800" b="1" dirty="0">
                 <a:solidFill>
                   <a:schemeClr val="bg1"/>
                 </a:solidFill>
@@ -10252,7 +10660,7 @@
               <a:t>Delete package from folder(s) identified by .</a:t>
             </a:r>
             <a:r>
-              <a:rPr lang="en-US" sz="3800" b="1" dirty="0" err="1" smtClean="0">
+              <a:rPr lang="en-US" sz="3800" b="1" dirty="0" err="1">
                 <a:solidFill>
                   <a:schemeClr val="bg1"/>
                 </a:solidFill>
@@ -10260,18 +10668,13 @@
               <a:t>libPaths</a:t>
             </a:r>
             <a:r>
-              <a:rPr lang="en-US" sz="3800" b="1" dirty="0" smtClean="0">
+              <a:rPr lang="en-US" sz="3800" b="1" dirty="0">
                 <a:solidFill>
                   <a:schemeClr val="bg1"/>
                 </a:solidFill>
               </a:rPr>
               <a:t>()…and keep trying</a:t>
             </a:r>
-            <a:endParaRPr lang="en-US" sz="3800" b="1" dirty="0">
-              <a:solidFill>
-                <a:schemeClr val="bg1"/>
-              </a:solidFill>
-            </a:endParaRPr>
           </a:p>
         </p:txBody>
       </p:sp>
@@ -10285,13 +10688,6 @@
   <p:clrMapOvr>
     <a:masterClrMapping/>
   </p:clrMapOvr>
-  <p:timing>
-    <p:tnLst>
-      <p:par>
-        <p:cTn id="1" dur="indefinite" restart="never" nodeType="tmRoot"/>
-      </p:par>
-    </p:tnLst>
-  </p:timing>
 </p:sld>
 </file>
 
@@ -10469,13 +10865,6 @@
   <p:clrMapOvr>
     <a:masterClrMapping/>
   </p:clrMapOvr>
-  <p:timing>
-    <p:tnLst>
-      <p:par>
-        <p:cTn id="1" dur="indefinite" restart="never" nodeType="tmRoot"/>
-      </p:par>
-    </p:tnLst>
-  </p:timing>
 </p:sld>
 </file>
 
@@ -10594,10 +10983,9 @@
           <a:lstStyle/>
           <a:p>
             <a:r>
-              <a:rPr lang="en-US" sz="3200" dirty="0" smtClean="0"/>
+              <a:rPr lang="en-US" sz="3200" dirty="0"/>
               <a:t>At least in the May, 2020 release of R Studio – prompted when need to install packages</a:t>
             </a:r>
-            <a:endParaRPr lang="en-US" sz="3200" dirty="0"/>
           </a:p>
         </p:txBody>
       </p:sp>
@@ -10635,13 +11023,6 @@
   <p:clrMapOvr>
     <a:masterClrMapping/>
   </p:clrMapOvr>
-  <p:timing>
-    <p:tnLst>
-      <p:par>
-        <p:cTn id="1" dur="indefinite" restart="never" nodeType="tmRoot"/>
-      </p:par>
-    </p:tnLst>
-  </p:timing>
 </p:sld>
 </file>
 
@@ -10828,13 +11209,6 @@
   <p:clrMapOvr>
     <a:masterClrMapping/>
   </p:clrMapOvr>
-  <p:timing>
-    <p:tnLst>
-      <p:par>
-        <p:cTn id="1" dur="indefinite" restart="never" nodeType="tmRoot"/>
-      </p:par>
-    </p:tnLst>
-  </p:timing>
 </p:sld>
 </file>
 
@@ -10940,13 +11314,6 @@
   <p:clrMapOvr>
     <a:masterClrMapping/>
   </p:clrMapOvr>
-  <p:timing>
-    <p:tnLst>
-      <p:par>
-        <p:cTn id="1" dur="indefinite" restart="never" nodeType="tmRoot"/>
-      </p:par>
-    </p:tnLst>
-  </p:timing>
 </p:sld>
 </file>
 
@@ -11066,18 +11433,13 @@
           <a:p>
             <a:pPr algn="ctr"/>
             <a:r>
-              <a:rPr lang="en-US" sz="3600" dirty="0" smtClean="0">
+              <a:rPr lang="en-US" sz="3600" dirty="0">
                 <a:solidFill>
                   <a:srgbClr val="00B050"/>
                 </a:solidFill>
               </a:rPr>
               <a:t>Patience: avoids HTTP 400 error</a:t>
             </a:r>
-            <a:endParaRPr lang="en-US" sz="3600" dirty="0">
-              <a:solidFill>
-                <a:srgbClr val="00B050"/>
-              </a:solidFill>
-            </a:endParaRPr>
           </a:p>
         </p:txBody>
       </p:sp>
@@ -11331,7 +11693,7 @@
           <a:p>
             <a:pPr algn="ctr"/>
             <a:r>
-              <a:rPr lang="en-US" sz="4400" dirty="0" err="1" smtClean="0">
+              <a:rPr lang="en-US" sz="4400" dirty="0" err="1">
                 <a:solidFill>
                   <a:schemeClr val="accent1">
                     <a:lumMod val="75000"/>
@@ -11374,18 +11736,13 @@
           <a:p>
             <a:pPr algn="ctr"/>
             <a:r>
-              <a:rPr lang="en-US" sz="3600" dirty="0" smtClean="0">
+              <a:rPr lang="en-US" sz="3600" dirty="0">
                 <a:solidFill>
                   <a:srgbClr val="00B050"/>
                 </a:solidFill>
               </a:rPr>
               <a:t>About that HTTP 400 error</a:t>
             </a:r>
-            <a:endParaRPr lang="en-US" sz="3600" dirty="0">
-              <a:solidFill>
-                <a:srgbClr val="00B050"/>
-              </a:solidFill>
-            </a:endParaRPr>
           </a:p>
         </p:txBody>
       </p:sp>
@@ -11460,7 +11817,7 @@
           <a:lstStyle/>
           <a:p>
             <a:r>
-              <a:rPr lang="en-US" sz="3200" dirty="0" err="1" smtClean="0">
+              <a:rPr lang="en-US" sz="3200" dirty="0" err="1">
                 <a:solidFill>
                   <a:srgbClr val="00B050"/>
                 </a:solidFill>
@@ -11468,7 +11825,7 @@
               <a:t>Rladies</a:t>
             </a:r>
             <a:r>
-              <a:rPr lang="en-US" sz="3200" dirty="0" smtClean="0">
+              <a:rPr lang="en-US" sz="3200" dirty="0">
                 <a:solidFill>
                   <a:srgbClr val="00B050"/>
                 </a:solidFill>
@@ -11476,7 +11833,7 @@
               <a:t> </a:t>
             </a:r>
             <a:r>
-              <a:rPr lang="en-US" sz="3200" dirty="0" err="1" smtClean="0">
+              <a:rPr lang="en-US" sz="3200" dirty="0" err="1">
                 <a:solidFill>
                   <a:srgbClr val="00B050"/>
                 </a:solidFill>
@@ -11484,7 +11841,7 @@
               <a:t>MeetupR</a:t>
             </a:r>
             <a:r>
-              <a:rPr lang="en-US" sz="3200" dirty="0" smtClean="0">
+              <a:rPr lang="en-US" sz="3200" dirty="0">
                 <a:solidFill>
                   <a:srgbClr val="00B050"/>
                 </a:solidFill>
@@ -11492,7 +11849,7 @@
               <a:t> package’s </a:t>
             </a:r>
             <a:r>
-              <a:rPr lang="en-US" sz="3200" dirty="0" err="1" smtClean="0">
+              <a:rPr lang="en-US" sz="3200" dirty="0" err="1">
                 <a:solidFill>
                   <a:srgbClr val="00B050"/>
                 </a:solidFill>
@@ -11500,7 +11857,7 @@
               <a:t>internals.R</a:t>
             </a:r>
             <a:r>
-              <a:rPr lang="en-US" sz="3200" dirty="0" smtClean="0">
+              <a:rPr lang="en-US" sz="3200" dirty="0">
                 <a:solidFill>
                   <a:srgbClr val="00B050"/>
                 </a:solidFill>
@@ -11517,18 +11874,13 @@
           </a:p>
           <a:p>
             <a:r>
-              <a:rPr lang="en-US" sz="3200" dirty="0" smtClean="0">
+              <a:rPr lang="en-US" sz="3200" dirty="0">
                 <a:solidFill>
                   <a:srgbClr val="00B050"/>
                 </a:solidFill>
               </a:rPr>
               <a:t>Shift+F9 to set a break point.</a:t>
             </a:r>
-            <a:endParaRPr lang="en-US" sz="3200" dirty="0">
-              <a:solidFill>
-                <a:srgbClr val="00B050"/>
-              </a:solidFill>
-            </a:endParaRPr>
           </a:p>
         </p:txBody>
       </p:sp>
@@ -11542,13 +11894,6 @@
   <p:clrMapOvr>
     <a:masterClrMapping/>
   </p:clrMapOvr>
-  <p:timing>
-    <p:tnLst>
-      <p:par>
-        <p:cTn id="1" dur="indefinite" restart="never" nodeType="tmRoot"/>
-      </p:par>
-    </p:tnLst>
-  </p:timing>
 </p:sld>
 </file>
 
@@ -11601,7 +11946,7 @@
           <a:p>
             <a:pPr algn="ctr"/>
             <a:r>
-              <a:rPr lang="en-US" sz="4400" dirty="0" err="1" smtClean="0">
+              <a:rPr lang="en-US" sz="4400" dirty="0" err="1">
                 <a:solidFill>
                   <a:schemeClr val="accent1">
                     <a:lumMod val="75000"/>
@@ -11644,18 +11989,13 @@
           <a:p>
             <a:pPr algn="ctr"/>
             <a:r>
-              <a:rPr lang="en-US" sz="3600" dirty="0" smtClean="0">
+              <a:rPr lang="en-US" sz="3600" dirty="0">
                 <a:solidFill>
                   <a:srgbClr val="00B050"/>
                 </a:solidFill>
               </a:rPr>
               <a:t>About that HTTP 400 error</a:t>
             </a:r>
-            <a:endParaRPr lang="en-US" sz="3600" dirty="0">
-              <a:solidFill>
-                <a:srgbClr val="00B050"/>
-              </a:solidFill>
-            </a:endParaRPr>
           </a:p>
         </p:txBody>
       </p:sp>
@@ -11682,7 +12022,7 @@
           <a:lstStyle/>
           <a:p>
             <a:r>
-              <a:rPr lang="en-US" sz="3200" dirty="0" err="1" smtClean="0">
+              <a:rPr lang="en-US" sz="3200" dirty="0" err="1">
                 <a:solidFill>
                   <a:srgbClr val="00B050"/>
                 </a:solidFill>
@@ -11690,7 +12030,7 @@
               <a:t>Rladies</a:t>
             </a:r>
             <a:r>
-              <a:rPr lang="en-US" sz="3200" dirty="0" smtClean="0">
+              <a:rPr lang="en-US" sz="3200" dirty="0">
                 <a:solidFill>
                   <a:srgbClr val="00B050"/>
                 </a:solidFill>
@@ -11698,7 +12038,7 @@
               <a:t> </a:t>
             </a:r>
             <a:r>
-              <a:rPr lang="en-US" sz="3200" dirty="0" err="1" smtClean="0">
+              <a:rPr lang="en-US" sz="3200" dirty="0" err="1">
                 <a:solidFill>
                   <a:srgbClr val="00B050"/>
                 </a:solidFill>
@@ -11706,7 +12046,7 @@
               <a:t>MeetupR</a:t>
             </a:r>
             <a:r>
-              <a:rPr lang="en-US" sz="3200" dirty="0" smtClean="0">
+              <a:rPr lang="en-US" sz="3200" dirty="0">
                 <a:solidFill>
                   <a:srgbClr val="00B050"/>
                 </a:solidFill>
@@ -11714,7 +12054,7 @@
               <a:t> package’s </a:t>
             </a:r>
             <a:r>
-              <a:rPr lang="en-US" sz="3200" dirty="0" err="1" smtClean="0">
+              <a:rPr lang="en-US" sz="3200" dirty="0" err="1">
                 <a:solidFill>
                   <a:srgbClr val="00B050"/>
                 </a:solidFill>
@@ -11722,7 +12062,7 @@
               <a:t>internals.R</a:t>
             </a:r>
             <a:r>
-              <a:rPr lang="en-US" sz="3200" dirty="0" smtClean="0">
+              <a:rPr lang="en-US" sz="3200" dirty="0">
                 <a:solidFill>
                   <a:srgbClr val="00B050"/>
                 </a:solidFill>
@@ -11739,18 +12079,13 @@
           </a:p>
           <a:p>
             <a:r>
-              <a:rPr lang="en-US" sz="3200" dirty="0" smtClean="0">
+              <a:rPr lang="en-US" sz="3200" dirty="0">
                 <a:solidFill>
                   <a:srgbClr val="00B050"/>
                 </a:solidFill>
               </a:rPr>
               <a:t>Shift+F9 to set a break point.</a:t>
             </a:r>
-            <a:endParaRPr lang="en-US" sz="3200" dirty="0">
-              <a:solidFill>
-                <a:srgbClr val="00B050"/>
-              </a:solidFill>
-            </a:endParaRPr>
           </a:p>
         </p:txBody>
       </p:sp>
@@ -11888,7 +12223,7 @@
           <a:lstStyle/>
           <a:p>
             <a:r>
-              <a:rPr lang="en-US" sz="3400" dirty="0" smtClean="0">
+              <a:rPr lang="en-US" sz="3400" dirty="0">
                 <a:solidFill>
                   <a:schemeClr val="accent5">
                     <a:lumMod val="75000"/>
@@ -11899,7 +12234,7 @@
               <a:t>A </a:t>
             </a:r>
             <a:r>
-              <a:rPr lang="en-US" sz="3400" b="1" dirty="0" smtClean="0">
+              <a:rPr lang="en-US" sz="3400" b="1" dirty="0">
                 <a:solidFill>
                   <a:schemeClr val="accent5">
                     <a:lumMod val="75000"/>
@@ -11909,14 +12244,6 @@
               </a:rPr>
               <a:t>breakpoint</a:t>
             </a:r>
-            <a:endParaRPr lang="en-US" sz="3400" b="1" dirty="0">
-              <a:solidFill>
-                <a:schemeClr val="accent5">
-                  <a:lumMod val="75000"/>
-                </a:schemeClr>
-              </a:solidFill>
-              <a:latin typeface="Georgia" panose="02040502050405020303" pitchFamily="18" charset="0"/>
-            </a:endParaRPr>
           </a:p>
         </p:txBody>
       </p:sp>
@@ -11930,13 +12257,6 @@
   <p:clrMapOvr>
     <a:masterClrMapping/>
   </p:clrMapOvr>
-  <p:timing>
-    <p:tnLst>
-      <p:par>
-        <p:cTn id="1" dur="indefinite" restart="never" nodeType="tmRoot"/>
-      </p:par>
-    </p:tnLst>
-  </p:timing>
 </p:sld>
 </file>
 
@@ -12010,18 +12330,13 @@
               <a:buChar char="•"/>
             </a:pPr>
             <a:r>
-              <a:rPr lang="en-US" sz="4600" dirty="0" smtClean="0">
+              <a:rPr lang="en-US" sz="4600" dirty="0">
                 <a:solidFill>
                   <a:srgbClr val="C00000"/>
                 </a:solidFill>
               </a:rPr>
               <a:t>Managing packages and their dependencies can be a drag</a:t>
             </a:r>
-            <a:endParaRPr lang="en-US" sz="4600" dirty="0">
-              <a:solidFill>
-                <a:srgbClr val="C00000"/>
-              </a:solidFill>
-            </a:endParaRPr>
           </a:p>
         </p:txBody>
       </p:sp>
@@ -12035,13 +12350,6 @@
   <p:clrMapOvr>
     <a:masterClrMapping/>
   </p:clrMapOvr>
-  <p:timing>
-    <p:tnLst>
-      <p:par>
-        <p:cTn id="1" dur="indefinite" restart="never" nodeType="tmRoot"/>
-      </p:par>
-    </p:tnLst>
-  </p:timing>
 </p:sld>
 </file>
 
@@ -12094,7 +12402,7 @@
           <a:p>
             <a:pPr algn="ctr"/>
             <a:r>
-              <a:rPr lang="en-US" sz="4400" dirty="0" err="1" smtClean="0">
+              <a:rPr lang="en-US" sz="4400" dirty="0" err="1">
                 <a:solidFill>
                   <a:schemeClr val="accent1">
                     <a:lumMod val="75000"/>
@@ -12137,18 +12445,13 @@
           <a:p>
             <a:pPr algn="ctr"/>
             <a:r>
-              <a:rPr lang="en-US" sz="3600" dirty="0" smtClean="0">
+              <a:rPr lang="en-US" sz="3600" dirty="0">
                 <a:solidFill>
                   <a:srgbClr val="00B050"/>
                 </a:solidFill>
               </a:rPr>
               <a:t>About that HTTP 400 error</a:t>
             </a:r>
-            <a:endParaRPr lang="en-US" sz="3600" dirty="0">
-              <a:solidFill>
-                <a:srgbClr val="00B050"/>
-              </a:solidFill>
-            </a:endParaRPr>
           </a:p>
         </p:txBody>
       </p:sp>
@@ -12203,10 +12506,9 @@
               <a:buChar char="•"/>
             </a:pPr>
             <a:r>
-              <a:rPr lang="en-US" sz="3200" dirty="0" smtClean="0"/>
+              <a:rPr lang="en-US" sz="3200" dirty="0"/>
               <a:t>CTRL+SHIFT+B to build package</a:t>
             </a:r>
-            <a:endParaRPr lang="en-US" sz="3200" dirty="0"/>
           </a:p>
         </p:txBody>
       </p:sp>
@@ -12244,13 +12546,6 @@
   <p:clrMapOvr>
     <a:masterClrMapping/>
   </p:clrMapOvr>
-  <p:timing>
-    <p:tnLst>
-      <p:par>
-        <p:cTn id="1" dur="indefinite" restart="never" nodeType="tmRoot"/>
-      </p:par>
-    </p:tnLst>
-  </p:timing>
 </p:sld>
 </file>
 
@@ -12303,7 +12598,7 @@
           <a:p>
             <a:pPr algn="ctr"/>
             <a:r>
-              <a:rPr lang="en-US" sz="4400" dirty="0" smtClean="0">
+              <a:rPr lang="en-US" sz="4400" dirty="0">
                 <a:solidFill>
                   <a:schemeClr val="accent1">
                     <a:lumMod val="75000"/>
@@ -12312,13 +12607,6 @@
               </a:rPr>
               <a:t>Debug Mode</a:t>
             </a:r>
-            <a:endParaRPr lang="en-US" sz="4400" dirty="0">
-              <a:solidFill>
-                <a:schemeClr val="accent1">
-                  <a:lumMod val="75000"/>
-                </a:schemeClr>
-              </a:solidFill>
-            </a:endParaRPr>
           </a:p>
         </p:txBody>
       </p:sp>
@@ -12346,18 +12634,13 @@
           <a:p>
             <a:pPr algn="ctr"/>
             <a:r>
-              <a:rPr lang="en-US" sz="3600" dirty="0" smtClean="0">
+              <a:rPr lang="en-US" sz="3600" dirty="0">
                 <a:solidFill>
                   <a:srgbClr val="00B050"/>
                 </a:solidFill>
               </a:rPr>
               <a:t>About that HTTP 400 error</a:t>
             </a:r>
-            <a:endParaRPr lang="en-US" sz="3600" dirty="0">
-              <a:solidFill>
-                <a:srgbClr val="00B050"/>
-              </a:solidFill>
-            </a:endParaRPr>
           </a:p>
         </p:txBody>
       </p:sp>
@@ -12395,13 +12678,6 @@
   <p:clrMapOvr>
     <a:masterClrMapping/>
   </p:clrMapOvr>
-  <p:timing>
-    <p:tnLst>
-      <p:par>
-        <p:cTn id="1" dur="indefinite" restart="never" nodeType="tmRoot"/>
-      </p:par>
-    </p:tnLst>
-  </p:timing>
 </p:sld>
 </file>
 
@@ -12454,7 +12730,7 @@
           <a:p>
             <a:pPr algn="ctr"/>
             <a:r>
-              <a:rPr lang="en-US" sz="4400" i="1" dirty="0" smtClean="0">
+              <a:rPr lang="en-US" sz="4400" i="1" dirty="0">
                 <a:solidFill>
                   <a:schemeClr val="accent1">
                     <a:lumMod val="75000"/>
@@ -12464,7 +12740,7 @@
               <a:t>added to </a:t>
             </a:r>
             <a:r>
-              <a:rPr lang="en-US" sz="4400" dirty="0" err="1" smtClean="0">
+              <a:rPr lang="en-US" sz="4400" dirty="0" err="1">
                 <a:solidFill>
                   <a:schemeClr val="accent1">
                     <a:lumMod val="75000"/>
@@ -12591,19 +12867,8 @@
                 <a:latin typeface="Courier New" panose="02070309020205020404" pitchFamily="49" charset="0"/>
                 <a:cs typeface="Courier New" panose="02070309020205020404" pitchFamily="49" charset="0"/>
               </a:rPr>
-              <a:t>         call. = FALSE</a:t>
-            </a:r>
-            <a:r>
-              <a:rPr lang="en-US" sz="3200" dirty="0" smtClean="0">
-                <a:latin typeface="Courier New" panose="02070309020205020404" pitchFamily="49" charset="0"/>
-                <a:cs typeface="Courier New" panose="02070309020205020404" pitchFamily="49" charset="0"/>
-              </a:rPr>
-              <a:t>) }</a:t>
-            </a:r>
-            <a:endParaRPr lang="en-US" sz="3200" dirty="0">
-              <a:latin typeface="Courier New" panose="02070309020205020404" pitchFamily="49" charset="0"/>
-              <a:cs typeface="Courier New" panose="02070309020205020404" pitchFamily="49" charset="0"/>
-            </a:endParaRPr>
+              <a:t>         call. = FALSE) }</a:t>
+            </a:r>
           </a:p>
         </p:txBody>
       </p:sp>
@@ -12617,13 +12882,6 @@
   <p:clrMapOvr>
     <a:masterClrMapping/>
   </p:clrMapOvr>
-  <p:timing>
-    <p:tnLst>
-      <p:par>
-        <p:cTn id="1" dur="indefinite" restart="never" nodeType="tmRoot"/>
-      </p:par>
-    </p:tnLst>
-  </p:timing>
 </p:sld>
 </file>
 
@@ -12719,18 +12977,13 @@
           <a:p>
             <a:pPr algn="ctr"/>
             <a:r>
-              <a:rPr lang="en-US" sz="3600" dirty="0" smtClean="0">
+              <a:rPr lang="en-US" sz="3600" dirty="0">
                 <a:solidFill>
                   <a:srgbClr val="00B050"/>
                 </a:solidFill>
               </a:rPr>
               <a:t>About that HTTP 400 error</a:t>
             </a:r>
-            <a:endParaRPr lang="en-US" sz="3600" dirty="0">
-              <a:solidFill>
-                <a:srgbClr val="00B050"/>
-              </a:solidFill>
-            </a:endParaRPr>
           </a:p>
         </p:txBody>
       </p:sp>
@@ -12792,13 +13045,6 @@
   <p:clrMapOvr>
     <a:masterClrMapping/>
   </p:clrMapOvr>
-  <p:timing>
-    <p:tnLst>
-      <p:par>
-        <p:cTn id="1" dur="indefinite" restart="never" nodeType="tmRoot"/>
-      </p:par>
-    </p:tnLst>
-  </p:timing>
 </p:sld>
 </file>
 
@@ -12894,7 +13140,7 @@
           <a:p>
             <a:pPr algn="ctr"/>
             <a:r>
-              <a:rPr lang="en-US" sz="3600" dirty="0" smtClean="0">
+              <a:rPr lang="en-US" sz="3600" dirty="0">
                 <a:solidFill>
                   <a:srgbClr val="00B050"/>
                 </a:solidFill>
@@ -12905,7 +13151,7 @@
           <a:p>
             <a:pPr algn="ctr"/>
             <a:r>
-              <a:rPr lang="en-US" sz="3600" dirty="0" smtClean="0">
+              <a:rPr lang="en-US" sz="3600" dirty="0">
                 <a:solidFill>
                   <a:srgbClr val="00B050"/>
                 </a:solidFill>
@@ -12913,7 +13159,7 @@
               <a:t> but it occurred in the </a:t>
             </a:r>
             <a:r>
-              <a:rPr lang="en-US" sz="3600" dirty="0" smtClean="0">
+              <a:rPr lang="en-US" sz="3600" dirty="0">
                 <a:solidFill>
                   <a:srgbClr val="FF0000"/>
                 </a:solidFill>
@@ -12928,11 +13174,6 @@
               </a:rPr>
               <a:t>?</a:t>
             </a:r>
-            <a:endParaRPr lang="en-US" sz="3600" dirty="0">
-              <a:solidFill>
-                <a:srgbClr val="00B050"/>
-              </a:solidFill>
-            </a:endParaRPr>
           </a:p>
         </p:txBody>
       </p:sp>
@@ -13110,13 +13351,6 @@
   <p:clrMapOvr>
     <a:masterClrMapping/>
   </p:clrMapOvr>
-  <p:timing>
-    <p:tnLst>
-      <p:par>
-        <p:cTn id="1" dur="indefinite" restart="never" nodeType="tmRoot"/>
-      </p:par>
-    </p:tnLst>
-  </p:timing>
 </p:sld>
 </file>
 
@@ -13230,7 +13464,7 @@
           <a:lstStyle/>
           <a:p>
             <a:r>
-              <a:rPr lang="en-US" sz="2800" b="1" dirty="0" smtClean="0">
+              <a:rPr lang="en-US" sz="2800" b="1" dirty="0">
                 <a:solidFill>
                   <a:srgbClr val="7030A0"/>
                 </a:solidFill>
@@ -13238,30 +13472,22 @@
               <a:t>Doctor Erin </a:t>
             </a:r>
             <a:r>
-              <a:rPr lang="en-US" sz="2800" b="1" dirty="0" err="1" smtClean="0">
+              <a:rPr lang="en-US" sz="2800" b="1" dirty="0" err="1">
                 <a:solidFill>
                   <a:srgbClr val="7030A0"/>
                 </a:solidFill>
               </a:rPr>
               <a:t>LeDell</a:t>
             </a:r>
-            <a:r>
-              <a:rPr lang="en-US" sz="2800" b="1" dirty="0" smtClean="0">
-                <a:solidFill>
-                  <a:srgbClr val="7030A0"/>
-                </a:solidFill>
-              </a:rPr>
-              <a:t/>
-            </a:r>
             <a:br>
-              <a:rPr lang="en-US" sz="2800" b="1" dirty="0" smtClean="0">
+              <a:rPr lang="en-US" sz="2800" b="1" dirty="0">
                 <a:solidFill>
                   <a:srgbClr val="7030A0"/>
                 </a:solidFill>
               </a:rPr>
             </a:br>
             <a:r>
-              <a:rPr lang="en-US" sz="2600" dirty="0" smtClean="0">
+              <a:rPr lang="en-US" sz="2600" dirty="0">
                 <a:solidFill>
                   <a:schemeClr val="accent6">
                     <a:lumMod val="75000"/>
@@ -13270,13 +13496,6 @@
               </a:rPr>
               <a:t>Co-founder of R-Ladies and Chief Machine Learning Scientist at H20.ai</a:t>
             </a:r>
-            <a:endParaRPr lang="en-US" sz="2600" dirty="0">
-              <a:solidFill>
-                <a:schemeClr val="accent6">
-                  <a:lumMod val="75000"/>
-                </a:schemeClr>
-              </a:solidFill>
-            </a:endParaRPr>
           </a:p>
         </p:txBody>
       </p:sp>
@@ -13290,13 +13509,620 @@
   <p:clrMapOvr>
     <a:masterClrMapping/>
   </p:clrMapOvr>
-  <p:timing>
-    <p:tnLst>
-      <p:par>
-        <p:cTn id="1" dur="indefinite" restart="never" nodeType="tmRoot"/>
-      </p:par>
-    </p:tnLst>
-  </p:timing>
+</p:sld>
+</file>
+
+<file path=ppt/slides/slide36.xml><?xml version="1.0" encoding="utf-8"?>
+<p:sld xmlns:a="http://schemas.openxmlformats.org/drawingml/2006/main" xmlns:r="http://schemas.openxmlformats.org/officeDocument/2006/relationships" xmlns:p="http://schemas.openxmlformats.org/presentationml/2006/main">
+  <p:cSld>
+    <p:spTree>
+      <p:nvGrpSpPr>
+        <p:cNvPr id="1" name=""/>
+        <p:cNvGrpSpPr/>
+        <p:nvPr/>
+      </p:nvGrpSpPr>
+      <p:grpSpPr>
+        <a:xfrm>
+          <a:off x="0" y="0"/>
+          <a:ext cx="0" cy="0"/>
+          <a:chOff x="0" y="0"/>
+          <a:chExt cx="0" cy="0"/>
+        </a:xfrm>
+      </p:grpSpPr>
+      <p:sp>
+        <p:nvSpPr>
+          <p:cNvPr id="6" name="TextBox 5"/>
+          <p:cNvSpPr txBox="1"/>
+          <p:nvPr/>
+        </p:nvSpPr>
+        <p:spPr>
+          <a:xfrm>
+            <a:off x="713678" y="89210"/>
+            <a:ext cx="11073161" cy="523220"/>
+          </a:xfrm>
+          <a:prstGeom prst="rect">
+            <a:avLst/>
+          </a:prstGeom>
+          <a:noFill/>
+        </p:spPr>
+        <p:txBody>
+          <a:bodyPr wrap="square" rtlCol="0">
+            <a:spAutoFit/>
+          </a:bodyPr>
+          <a:lstStyle/>
+          <a:p>
+            <a:r>
+              <a:rPr lang="en-US" sz="2800" b="1" dirty="0" err="1">
+                <a:solidFill>
+                  <a:srgbClr val="7030A0"/>
+                </a:solidFill>
+              </a:rPr>
+              <a:t>Meetupr</a:t>
+            </a:r>
+            <a:r>
+              <a:rPr lang="en-US" sz="2800" b="1" dirty="0">
+                <a:solidFill>
+                  <a:srgbClr val="7030A0"/>
+                </a:solidFill>
+              </a:rPr>
+              <a:t> </a:t>
+            </a:r>
+            <a:r>
+              <a:rPr lang="en-US" sz="2800" b="1" dirty="0" err="1">
+                <a:solidFill>
+                  <a:srgbClr val="7030A0"/>
+                </a:solidFill>
+              </a:rPr>
+              <a:t>Github</a:t>
+            </a:r>
+            <a:r>
+              <a:rPr lang="en-US" sz="2800" b="1" dirty="0">
+                <a:solidFill>
+                  <a:srgbClr val="7030A0"/>
+                </a:solidFill>
+              </a:rPr>
+              <a:t> page</a:t>
+            </a:r>
+            <a:endParaRPr lang="en-US" sz="2600" dirty="0">
+              <a:solidFill>
+                <a:schemeClr val="accent6">
+                  <a:lumMod val="75000"/>
+                </a:schemeClr>
+              </a:solidFill>
+            </a:endParaRPr>
+          </a:p>
+        </p:txBody>
+      </p:sp>
+      <p:pic>
+        <p:nvPicPr>
+          <p:cNvPr id="3" name="Picture 2">
+            <a:extLst>
+              <a:ext uri="{FF2B5EF4-FFF2-40B4-BE49-F238E27FC236}">
+                <a16:creationId xmlns:a16="http://schemas.microsoft.com/office/drawing/2014/main" id="{99B71F97-D898-4A75-A5FF-5E76999D17A3}"/>
+              </a:ext>
+            </a:extLst>
+          </p:cNvPr>
+          <p:cNvPicPr>
+            <a:picLocks noChangeAspect="1"/>
+          </p:cNvPicPr>
+          <p:nvPr/>
+        </p:nvPicPr>
+        <p:blipFill>
+          <a:blip r:embed="rId3"/>
+          <a:stretch>
+            <a:fillRect/>
+          </a:stretch>
+        </p:blipFill>
+        <p:spPr>
+          <a:xfrm>
+            <a:off x="207720" y="1442664"/>
+            <a:ext cx="11776560" cy="2658819"/>
+          </a:xfrm>
+          <a:prstGeom prst="rect">
+            <a:avLst/>
+          </a:prstGeom>
+        </p:spPr>
+      </p:pic>
+    </p:spTree>
+    <p:extLst>
+      <p:ext uri="{BB962C8B-B14F-4D97-AF65-F5344CB8AC3E}">
+        <p14:creationId xmlns:p14="http://schemas.microsoft.com/office/powerpoint/2010/main" val="1734121729"/>
+      </p:ext>
+    </p:extLst>
+  </p:cSld>
+  <p:clrMapOvr>
+    <a:masterClrMapping/>
+  </p:clrMapOvr>
+</p:sld>
+</file>
+
+<file path=ppt/slides/slide37.xml><?xml version="1.0" encoding="utf-8"?>
+<p:sld xmlns:a="http://schemas.openxmlformats.org/drawingml/2006/main" xmlns:r="http://schemas.openxmlformats.org/officeDocument/2006/relationships" xmlns:p="http://schemas.openxmlformats.org/presentationml/2006/main">
+  <p:cSld>
+    <p:spTree>
+      <p:nvGrpSpPr>
+        <p:cNvPr id="1" name=""/>
+        <p:cNvGrpSpPr/>
+        <p:nvPr/>
+      </p:nvGrpSpPr>
+      <p:grpSpPr>
+        <a:xfrm>
+          <a:off x="0" y="0"/>
+          <a:ext cx="0" cy="0"/>
+          <a:chOff x="0" y="0"/>
+          <a:chExt cx="0" cy="0"/>
+        </a:xfrm>
+      </p:grpSpPr>
+      <p:sp>
+        <p:nvSpPr>
+          <p:cNvPr id="6" name="TextBox 5"/>
+          <p:cNvSpPr txBox="1"/>
+          <p:nvPr/>
+        </p:nvSpPr>
+        <p:spPr>
+          <a:xfrm>
+            <a:off x="713678" y="89210"/>
+            <a:ext cx="11073161" cy="523220"/>
+          </a:xfrm>
+          <a:prstGeom prst="rect">
+            <a:avLst/>
+          </a:prstGeom>
+          <a:noFill/>
+        </p:spPr>
+        <p:txBody>
+          <a:bodyPr wrap="square" rtlCol="0">
+            <a:spAutoFit/>
+          </a:bodyPr>
+          <a:lstStyle/>
+          <a:p>
+            <a:r>
+              <a:rPr lang="en-US" sz="2800" b="1" dirty="0" err="1">
+                <a:solidFill>
+                  <a:srgbClr val="7030A0"/>
+                </a:solidFill>
+              </a:rPr>
+              <a:t>Meetupr</a:t>
+            </a:r>
+            <a:r>
+              <a:rPr lang="en-US" sz="2800" b="1" dirty="0">
+                <a:solidFill>
+                  <a:srgbClr val="7030A0"/>
+                </a:solidFill>
+              </a:rPr>
+              <a:t> </a:t>
+            </a:r>
+            <a:r>
+              <a:rPr lang="en-US" sz="2800" b="1" dirty="0" err="1">
+                <a:solidFill>
+                  <a:srgbClr val="7030A0"/>
+                </a:solidFill>
+              </a:rPr>
+              <a:t>Github</a:t>
+            </a:r>
+            <a:r>
+              <a:rPr lang="en-US" sz="2800" b="1" dirty="0">
+                <a:solidFill>
+                  <a:srgbClr val="7030A0"/>
+                </a:solidFill>
+              </a:rPr>
+              <a:t> page</a:t>
+            </a:r>
+            <a:endParaRPr lang="en-US" sz="2600" dirty="0">
+              <a:solidFill>
+                <a:schemeClr val="accent6">
+                  <a:lumMod val="75000"/>
+                </a:schemeClr>
+              </a:solidFill>
+            </a:endParaRPr>
+          </a:p>
+        </p:txBody>
+      </p:sp>
+      <p:pic>
+        <p:nvPicPr>
+          <p:cNvPr id="4" name="Picture 3">
+            <a:extLst>
+              <a:ext uri="{FF2B5EF4-FFF2-40B4-BE49-F238E27FC236}">
+                <a16:creationId xmlns:a16="http://schemas.microsoft.com/office/drawing/2014/main" id="{54C8F583-5993-4275-B8EE-DBE952A002A6}"/>
+              </a:ext>
+            </a:extLst>
+          </p:cNvPr>
+          <p:cNvPicPr>
+            <a:picLocks noChangeAspect="1"/>
+          </p:cNvPicPr>
+          <p:nvPr/>
+        </p:nvPicPr>
+        <p:blipFill>
+          <a:blip r:embed="rId3"/>
+          <a:stretch>
+            <a:fillRect/>
+          </a:stretch>
+        </p:blipFill>
+        <p:spPr>
+          <a:xfrm>
+            <a:off x="349692" y="1119214"/>
+            <a:ext cx="11175631" cy="4619571"/>
+          </a:xfrm>
+          <a:prstGeom prst="rect">
+            <a:avLst/>
+          </a:prstGeom>
+        </p:spPr>
+      </p:pic>
+    </p:spTree>
+    <p:extLst>
+      <p:ext uri="{BB962C8B-B14F-4D97-AF65-F5344CB8AC3E}">
+        <p14:creationId xmlns:p14="http://schemas.microsoft.com/office/powerpoint/2010/main" val="315693277"/>
+      </p:ext>
+    </p:extLst>
+  </p:cSld>
+  <p:clrMapOvr>
+    <a:masterClrMapping/>
+  </p:clrMapOvr>
+</p:sld>
+</file>
+
+<file path=ppt/slides/slide38.xml><?xml version="1.0" encoding="utf-8"?>
+<p:sld xmlns:a="http://schemas.openxmlformats.org/drawingml/2006/main" xmlns:r="http://schemas.openxmlformats.org/officeDocument/2006/relationships" xmlns:p="http://schemas.openxmlformats.org/presentationml/2006/main">
+  <p:cSld>
+    <p:spTree>
+      <p:nvGrpSpPr>
+        <p:cNvPr id="1" name=""/>
+        <p:cNvGrpSpPr/>
+        <p:nvPr/>
+      </p:nvGrpSpPr>
+      <p:grpSpPr>
+        <a:xfrm>
+          <a:off x="0" y="0"/>
+          <a:ext cx="0" cy="0"/>
+          <a:chOff x="0" y="0"/>
+          <a:chExt cx="0" cy="0"/>
+        </a:xfrm>
+      </p:grpSpPr>
+      <p:sp>
+        <p:nvSpPr>
+          <p:cNvPr id="9" name="TextBox 8">
+            <a:extLst>
+              <a:ext uri="{FF2B5EF4-FFF2-40B4-BE49-F238E27FC236}">
+                <a16:creationId xmlns:a16="http://schemas.microsoft.com/office/drawing/2014/main" id="{4E025669-79A1-4B53-977D-8C0514E835B9}"/>
+              </a:ext>
+            </a:extLst>
+          </p:cNvPr>
+          <p:cNvSpPr txBox="1"/>
+          <p:nvPr/>
+        </p:nvSpPr>
+        <p:spPr>
+          <a:xfrm>
+            <a:off x="6995603" y="0"/>
+            <a:ext cx="3747797" cy="769441"/>
+          </a:xfrm>
+          <a:prstGeom prst="rect">
+            <a:avLst/>
+          </a:prstGeom>
+          <a:solidFill>
+            <a:schemeClr val="accent4"/>
+          </a:solidFill>
+        </p:spPr>
+        <p:txBody>
+          <a:bodyPr wrap="square" rtlCol="0">
+            <a:spAutoFit/>
+          </a:bodyPr>
+          <a:lstStyle/>
+          <a:p>
+            <a:pPr algn="ctr"/>
+            <a:r>
+              <a:rPr lang="en-US" sz="4400" dirty="0">
+                <a:solidFill>
+                  <a:schemeClr val="accent1">
+                    <a:lumMod val="75000"/>
+                  </a:schemeClr>
+                </a:solidFill>
+              </a:rPr>
+              <a:t>Collaborate?</a:t>
+            </a:r>
+          </a:p>
+        </p:txBody>
+      </p:sp>
+      <p:sp>
+        <p:nvSpPr>
+          <p:cNvPr id="5" name="TextBox 4"/>
+          <p:cNvSpPr txBox="1"/>
+          <p:nvPr/>
+        </p:nvSpPr>
+        <p:spPr>
+          <a:xfrm>
+            <a:off x="667979" y="930377"/>
+            <a:ext cx="11163300" cy="3416320"/>
+          </a:xfrm>
+          <a:prstGeom prst="rect">
+            <a:avLst/>
+          </a:prstGeom>
+          <a:noFill/>
+        </p:spPr>
+        <p:txBody>
+          <a:bodyPr wrap="square" rtlCol="0">
+            <a:spAutoFit/>
+          </a:bodyPr>
+          <a:lstStyle/>
+          <a:p>
+            <a:pPr marL="742950" indent="-742950">
+              <a:buAutoNum type="arabicPeriod"/>
+            </a:pPr>
+            <a:r>
+              <a:rPr lang="en-US" sz="3600" dirty="0"/>
+              <a:t>Download and install the latest versions of R and R Studio</a:t>
+            </a:r>
+          </a:p>
+          <a:p>
+            <a:pPr marL="1200150" lvl="1" indent="-742950">
+              <a:buAutoNum type="arabicPeriod"/>
+            </a:pPr>
+            <a:r>
+              <a:rPr lang="en-US" sz="3600" dirty="0"/>
+              <a:t>Package concerns may take time</a:t>
+            </a:r>
+          </a:p>
+          <a:p>
+            <a:pPr marL="742950" indent="-742950">
+              <a:buAutoNum type="arabicPeriod"/>
+            </a:pPr>
+            <a:r>
+              <a:rPr lang="en-US" sz="3600" dirty="0"/>
+              <a:t>Download and install R Tools</a:t>
+            </a:r>
+          </a:p>
+          <a:p>
+            <a:pPr marL="742950" indent="-742950">
+              <a:buAutoNum type="arabicPeriod"/>
+            </a:pPr>
+            <a:endParaRPr lang="en-US" sz="3600" dirty="0"/>
+          </a:p>
+          <a:p>
+            <a:pPr marL="742950" indent="-742950">
+              <a:buAutoNum type="arabicPeriod"/>
+            </a:pPr>
+            <a:endParaRPr lang="en-US" sz="3600" dirty="0"/>
+          </a:p>
+        </p:txBody>
+      </p:sp>
+    </p:spTree>
+    <p:extLst>
+      <p:ext uri="{BB962C8B-B14F-4D97-AF65-F5344CB8AC3E}">
+        <p14:creationId xmlns:p14="http://schemas.microsoft.com/office/powerpoint/2010/main" val="1945832501"/>
+      </p:ext>
+    </p:extLst>
+  </p:cSld>
+  <p:clrMapOvr>
+    <a:masterClrMapping/>
+  </p:clrMapOvr>
+</p:sld>
+</file>
+
+<file path=ppt/slides/slide39.xml><?xml version="1.0" encoding="utf-8"?>
+<p:sld xmlns:a="http://schemas.openxmlformats.org/drawingml/2006/main" xmlns:r="http://schemas.openxmlformats.org/officeDocument/2006/relationships" xmlns:p="http://schemas.openxmlformats.org/presentationml/2006/main">
+  <p:cSld>
+    <p:spTree>
+      <p:nvGrpSpPr>
+        <p:cNvPr id="1" name=""/>
+        <p:cNvGrpSpPr/>
+        <p:nvPr/>
+      </p:nvGrpSpPr>
+      <p:grpSpPr>
+        <a:xfrm>
+          <a:off x="0" y="0"/>
+          <a:ext cx="0" cy="0"/>
+          <a:chOff x="0" y="0"/>
+          <a:chExt cx="0" cy="0"/>
+        </a:xfrm>
+      </p:grpSpPr>
+      <p:sp>
+        <p:nvSpPr>
+          <p:cNvPr id="9" name="TextBox 8">
+            <a:extLst>
+              <a:ext uri="{FF2B5EF4-FFF2-40B4-BE49-F238E27FC236}">
+                <a16:creationId xmlns:a16="http://schemas.microsoft.com/office/drawing/2014/main" id="{4E025669-79A1-4B53-977D-8C0514E835B9}"/>
+              </a:ext>
+            </a:extLst>
+          </p:cNvPr>
+          <p:cNvSpPr txBox="1"/>
+          <p:nvPr/>
+        </p:nvSpPr>
+        <p:spPr>
+          <a:xfrm>
+            <a:off x="6995603" y="0"/>
+            <a:ext cx="3747797" cy="769441"/>
+          </a:xfrm>
+          <a:prstGeom prst="rect">
+            <a:avLst/>
+          </a:prstGeom>
+          <a:solidFill>
+            <a:schemeClr val="accent4"/>
+          </a:solidFill>
+        </p:spPr>
+        <p:txBody>
+          <a:bodyPr wrap="square" rtlCol="0">
+            <a:spAutoFit/>
+          </a:bodyPr>
+          <a:lstStyle/>
+          <a:p>
+            <a:pPr algn="ctr"/>
+            <a:r>
+              <a:rPr lang="en-US" sz="4400" dirty="0">
+                <a:solidFill>
+                  <a:schemeClr val="accent1">
+                    <a:lumMod val="75000"/>
+                  </a:schemeClr>
+                </a:solidFill>
+              </a:rPr>
+              <a:t>R Studio</a:t>
+            </a:r>
+          </a:p>
+        </p:txBody>
+      </p:sp>
+      <p:sp>
+        <p:nvSpPr>
+          <p:cNvPr id="5" name="TextBox 4"/>
+          <p:cNvSpPr txBox="1"/>
+          <p:nvPr/>
+        </p:nvSpPr>
+        <p:spPr>
+          <a:xfrm>
+            <a:off x="667979" y="930377"/>
+            <a:ext cx="11163300" cy="6186309"/>
+          </a:xfrm>
+          <a:prstGeom prst="rect">
+            <a:avLst/>
+          </a:prstGeom>
+          <a:noFill/>
+        </p:spPr>
+        <p:txBody>
+          <a:bodyPr wrap="square" rtlCol="0">
+            <a:spAutoFit/>
+          </a:bodyPr>
+          <a:lstStyle/>
+          <a:p>
+            <a:pPr marL="742950" indent="-742950">
+              <a:buAutoNum type="arabicPeriod"/>
+            </a:pPr>
+            <a:r>
+              <a:rPr lang="en-US" sz="3600" dirty="0"/>
+              <a:t>File -&gt; New Project -&gt; Version Control -&gt; Git</a:t>
+            </a:r>
+          </a:p>
+          <a:p>
+            <a:pPr marL="742950" indent="-742950">
+              <a:buAutoNum type="arabicPeriod"/>
+            </a:pPr>
+            <a:endParaRPr lang="en-US" sz="3600" dirty="0"/>
+          </a:p>
+          <a:p>
+            <a:pPr marL="742950" indent="-742950">
+              <a:buAutoNum type="arabicPeriod"/>
+            </a:pPr>
+            <a:endParaRPr lang="en-US" sz="3600" dirty="0"/>
+          </a:p>
+          <a:p>
+            <a:pPr marL="742950" indent="-742950">
+              <a:buAutoNum type="arabicPeriod"/>
+            </a:pPr>
+            <a:endParaRPr lang="en-US" sz="3600" dirty="0"/>
+          </a:p>
+          <a:p>
+            <a:pPr marL="742950" indent="-742950">
+              <a:buAutoNum type="arabicPeriod"/>
+            </a:pPr>
+            <a:r>
+              <a:rPr lang="en-US" sz="3600" dirty="0"/>
+              <a:t>Make </a:t>
+            </a:r>
+            <a:r>
+              <a:rPr lang="en-US" sz="3600" dirty="0">
+                <a:hlinkClick r:id="rId3"/>
+              </a:rPr>
+              <a:t>https://github.com/RickPack/meetupxlanimate</a:t>
+            </a:r>
+            <a:r>
+              <a:rPr lang="en-US" sz="3600" dirty="0"/>
+              <a:t> the Repository URL -&gt; Create Project</a:t>
+            </a:r>
+          </a:p>
+          <a:p>
+            <a:pPr marL="742950" indent="-742950">
+              <a:buAutoNum type="arabicPeriod"/>
+            </a:pPr>
+            <a:endParaRPr lang="en-US" sz="3600" dirty="0"/>
+          </a:p>
+          <a:p>
+            <a:endParaRPr lang="en-US" sz="3600" dirty="0"/>
+          </a:p>
+          <a:p>
+            <a:pPr marL="742950" indent="-742950">
+              <a:buAutoNum type="arabicPeriod"/>
+            </a:pPr>
+            <a:endParaRPr lang="en-US" sz="3600" dirty="0"/>
+          </a:p>
+          <a:p>
+            <a:pPr marL="742950" indent="-742950">
+              <a:buAutoNum type="arabicPeriod"/>
+            </a:pPr>
+            <a:endParaRPr lang="en-US" sz="3600" dirty="0"/>
+          </a:p>
+          <a:p>
+            <a:pPr marL="742950" indent="-742950">
+              <a:buAutoNum type="arabicPeriod"/>
+            </a:pPr>
+            <a:endParaRPr lang="en-US" sz="3600" dirty="0"/>
+          </a:p>
+        </p:txBody>
+      </p:sp>
+      <p:pic>
+        <p:nvPicPr>
+          <p:cNvPr id="3" name="Picture 2">
+            <a:extLst>
+              <a:ext uri="{FF2B5EF4-FFF2-40B4-BE49-F238E27FC236}">
+                <a16:creationId xmlns:a16="http://schemas.microsoft.com/office/drawing/2014/main" id="{5ACAC4BC-C2D2-4ADF-8F6B-9BAB908BB42B}"/>
+              </a:ext>
+            </a:extLst>
+          </p:cNvPr>
+          <p:cNvPicPr>
+            <a:picLocks noChangeAspect="1"/>
+          </p:cNvPicPr>
+          <p:nvPr/>
+        </p:nvPicPr>
+        <p:blipFill>
+          <a:blip r:embed="rId4"/>
+          <a:stretch>
+            <a:fillRect/>
+          </a:stretch>
+        </p:blipFill>
+        <p:spPr>
+          <a:xfrm>
+            <a:off x="2023252" y="1487817"/>
+            <a:ext cx="5691443" cy="1726617"/>
+          </a:xfrm>
+          <a:prstGeom prst="rect">
+            <a:avLst/>
+          </a:prstGeom>
+        </p:spPr>
+      </p:pic>
+      <p:pic>
+        <p:nvPicPr>
+          <p:cNvPr id="6" name="Picture 5">
+            <a:extLst>
+              <a:ext uri="{FF2B5EF4-FFF2-40B4-BE49-F238E27FC236}">
+                <a16:creationId xmlns:a16="http://schemas.microsoft.com/office/drawing/2014/main" id="{EFAFAEE5-E7BD-4CFE-B0E2-5873324487D1}"/>
+              </a:ext>
+            </a:extLst>
+          </p:cNvPr>
+          <p:cNvPicPr>
+            <a:picLocks noChangeAspect="1"/>
+          </p:cNvPicPr>
+          <p:nvPr/>
+        </p:nvPicPr>
+        <p:blipFill>
+          <a:blip r:embed="rId5"/>
+          <a:stretch>
+            <a:fillRect/>
+          </a:stretch>
+        </p:blipFill>
+        <p:spPr>
+          <a:xfrm>
+            <a:off x="2023252" y="4273189"/>
+            <a:ext cx="5824608" cy="2479511"/>
+          </a:xfrm>
+          <a:prstGeom prst="rect">
+            <a:avLst/>
+          </a:prstGeom>
+        </p:spPr>
+      </p:pic>
+    </p:spTree>
+    <p:extLst>
+      <p:ext uri="{BB962C8B-B14F-4D97-AF65-F5344CB8AC3E}">
+        <p14:creationId xmlns:p14="http://schemas.microsoft.com/office/powerpoint/2010/main" val="2788518494"/>
+      </p:ext>
+    </p:extLst>
+  </p:cSld>
+  <p:clrMapOvr>
+    <a:masterClrMapping/>
+  </p:clrMapOvr>
 </p:sld>
 </file>
 
@@ -13493,18 +14319,13 @@
           <a:p>
             <a:pPr algn="r"/>
             <a:r>
-              <a:rPr lang="en-US" sz="2400" u="sng" dirty="0" smtClean="0">
+              <a:rPr lang="en-US" sz="2400" u="sng" dirty="0">
                 <a:solidFill>
                   <a:srgbClr val="7030A0"/>
                 </a:solidFill>
               </a:rPr>
               <a:t>That’s me</a:t>
             </a:r>
-            <a:endParaRPr lang="en-US" sz="2400" u="sng" dirty="0">
-              <a:solidFill>
-                <a:srgbClr val="7030A0"/>
-              </a:solidFill>
-            </a:endParaRPr>
           </a:p>
         </p:txBody>
       </p:sp>
@@ -13717,6 +14538,335 @@
 </p:sld>
 </file>
 
+<file path=ppt/slides/slide40.xml><?xml version="1.0" encoding="utf-8"?>
+<p:sld xmlns:a="http://schemas.openxmlformats.org/drawingml/2006/main" xmlns:r="http://schemas.openxmlformats.org/officeDocument/2006/relationships" xmlns:p="http://schemas.openxmlformats.org/presentationml/2006/main">
+  <p:cSld>
+    <p:spTree>
+      <p:nvGrpSpPr>
+        <p:cNvPr id="1" name=""/>
+        <p:cNvGrpSpPr/>
+        <p:nvPr/>
+      </p:nvGrpSpPr>
+      <p:grpSpPr>
+        <a:xfrm>
+          <a:off x="0" y="0"/>
+          <a:ext cx="0" cy="0"/>
+          <a:chOff x="0" y="0"/>
+          <a:chExt cx="0" cy="0"/>
+        </a:xfrm>
+      </p:grpSpPr>
+      <p:sp>
+        <p:nvSpPr>
+          <p:cNvPr id="9" name="TextBox 8">
+            <a:extLst>
+              <a:ext uri="{FF2B5EF4-FFF2-40B4-BE49-F238E27FC236}">
+                <a16:creationId xmlns:a16="http://schemas.microsoft.com/office/drawing/2014/main" id="{4E025669-79A1-4B53-977D-8C0514E835B9}"/>
+              </a:ext>
+            </a:extLst>
+          </p:cNvPr>
+          <p:cNvSpPr txBox="1"/>
+          <p:nvPr/>
+        </p:nvSpPr>
+        <p:spPr>
+          <a:xfrm>
+            <a:off x="6995603" y="0"/>
+            <a:ext cx="3747797" cy="769441"/>
+          </a:xfrm>
+          <a:prstGeom prst="rect">
+            <a:avLst/>
+          </a:prstGeom>
+          <a:solidFill>
+            <a:schemeClr val="accent4"/>
+          </a:solidFill>
+        </p:spPr>
+        <p:txBody>
+          <a:bodyPr wrap="square" rtlCol="0">
+            <a:spAutoFit/>
+          </a:bodyPr>
+          <a:lstStyle/>
+          <a:p>
+            <a:pPr algn="ctr"/>
+            <a:r>
+              <a:rPr lang="en-US" sz="4400" dirty="0">
+                <a:solidFill>
+                  <a:schemeClr val="accent1">
+                    <a:lumMod val="75000"/>
+                  </a:schemeClr>
+                </a:solidFill>
+              </a:rPr>
+              <a:t>Collaborate?</a:t>
+            </a:r>
+          </a:p>
+        </p:txBody>
+      </p:sp>
+      <p:pic>
+        <p:nvPicPr>
+          <p:cNvPr id="3" name="Picture 2">
+            <a:extLst>
+              <a:ext uri="{FF2B5EF4-FFF2-40B4-BE49-F238E27FC236}">
+                <a16:creationId xmlns:a16="http://schemas.microsoft.com/office/drawing/2014/main" id="{B415F761-C733-458B-8BB1-D0558F35EA63}"/>
+              </a:ext>
+            </a:extLst>
+          </p:cNvPr>
+          <p:cNvPicPr>
+            <a:picLocks noChangeAspect="1"/>
+          </p:cNvPicPr>
+          <p:nvPr/>
+        </p:nvPicPr>
+        <p:blipFill>
+          <a:blip r:embed="rId3"/>
+          <a:stretch>
+            <a:fillRect/>
+          </a:stretch>
+        </p:blipFill>
+        <p:spPr>
+          <a:xfrm>
+            <a:off x="233855" y="1756968"/>
+            <a:ext cx="10751180" cy="2084829"/>
+          </a:xfrm>
+          <a:prstGeom prst="rect">
+            <a:avLst/>
+          </a:prstGeom>
+        </p:spPr>
+      </p:pic>
+      <p:pic>
+        <p:nvPicPr>
+          <p:cNvPr id="6" name="Picture 5">
+            <a:extLst>
+              <a:ext uri="{FF2B5EF4-FFF2-40B4-BE49-F238E27FC236}">
+                <a16:creationId xmlns:a16="http://schemas.microsoft.com/office/drawing/2014/main" id="{C334A965-247A-4A4A-B7DC-DF932F8D830D}"/>
+              </a:ext>
+            </a:extLst>
+          </p:cNvPr>
+          <p:cNvPicPr>
+            <a:picLocks noChangeAspect="1"/>
+          </p:cNvPicPr>
+          <p:nvPr/>
+        </p:nvPicPr>
+        <p:blipFill>
+          <a:blip r:embed="rId4"/>
+          <a:stretch>
+            <a:fillRect/>
+          </a:stretch>
+        </p:blipFill>
+        <p:spPr>
+          <a:xfrm>
+            <a:off x="549554" y="972652"/>
+            <a:ext cx="3067478" cy="581106"/>
+          </a:xfrm>
+          <a:prstGeom prst="rect">
+            <a:avLst/>
+          </a:prstGeom>
+        </p:spPr>
+      </p:pic>
+    </p:spTree>
+    <p:extLst>
+      <p:ext uri="{BB962C8B-B14F-4D97-AF65-F5344CB8AC3E}">
+        <p14:creationId xmlns:p14="http://schemas.microsoft.com/office/powerpoint/2010/main" val="1958159349"/>
+      </p:ext>
+    </p:extLst>
+  </p:cSld>
+  <p:clrMapOvr>
+    <a:masterClrMapping/>
+  </p:clrMapOvr>
+</p:sld>
+</file>
+
+<file path=ppt/slides/slide41.xml><?xml version="1.0" encoding="utf-8"?>
+<p:sld xmlns:a="http://schemas.openxmlformats.org/drawingml/2006/main" xmlns:r="http://schemas.openxmlformats.org/officeDocument/2006/relationships" xmlns:p="http://schemas.openxmlformats.org/presentationml/2006/main">
+  <p:cSld>
+    <p:spTree>
+      <p:nvGrpSpPr>
+        <p:cNvPr id="1" name=""/>
+        <p:cNvGrpSpPr/>
+        <p:nvPr/>
+      </p:nvGrpSpPr>
+      <p:grpSpPr>
+        <a:xfrm>
+          <a:off x="0" y="0"/>
+          <a:ext cx="0" cy="0"/>
+          <a:chOff x="0" y="0"/>
+          <a:chExt cx="0" cy="0"/>
+        </a:xfrm>
+      </p:grpSpPr>
+      <p:sp>
+        <p:nvSpPr>
+          <p:cNvPr id="9" name="TextBox 8">
+            <a:extLst>
+              <a:ext uri="{FF2B5EF4-FFF2-40B4-BE49-F238E27FC236}">
+                <a16:creationId xmlns:a16="http://schemas.microsoft.com/office/drawing/2014/main" id="{4E025669-79A1-4B53-977D-8C0514E835B9}"/>
+              </a:ext>
+            </a:extLst>
+          </p:cNvPr>
+          <p:cNvSpPr txBox="1"/>
+          <p:nvPr/>
+        </p:nvSpPr>
+        <p:spPr>
+          <a:xfrm>
+            <a:off x="2061882" y="42087"/>
+            <a:ext cx="8654886" cy="769441"/>
+          </a:xfrm>
+          <a:prstGeom prst="rect">
+            <a:avLst/>
+          </a:prstGeom>
+          <a:solidFill>
+            <a:schemeClr val="accent4"/>
+          </a:solidFill>
+        </p:spPr>
+        <p:txBody>
+          <a:bodyPr wrap="square" rtlCol="0">
+            <a:spAutoFit/>
+          </a:bodyPr>
+          <a:lstStyle/>
+          <a:p>
+            <a:pPr algn="ctr"/>
+            <a:r>
+              <a:rPr lang="en-US" sz="4400" dirty="0">
+                <a:solidFill>
+                  <a:schemeClr val="accent1">
+                    <a:lumMod val="75000"/>
+                  </a:schemeClr>
+                </a:solidFill>
+              </a:rPr>
+              <a:t>Rick Pack</a:t>
+            </a:r>
+          </a:p>
+        </p:txBody>
+      </p:sp>
+      <p:sp>
+        <p:nvSpPr>
+          <p:cNvPr id="5" name="TextBox 4"/>
+          <p:cNvSpPr txBox="1"/>
+          <p:nvPr/>
+        </p:nvSpPr>
+        <p:spPr>
+          <a:xfrm>
+            <a:off x="535276" y="1329872"/>
+            <a:ext cx="11163300" cy="3477875"/>
+          </a:xfrm>
+          <a:prstGeom prst="rect">
+            <a:avLst/>
+          </a:prstGeom>
+          <a:noFill/>
+        </p:spPr>
+        <p:txBody>
+          <a:bodyPr wrap="square" rtlCol="0">
+            <a:spAutoFit/>
+          </a:bodyPr>
+          <a:lstStyle/>
+          <a:p>
+            <a:pPr algn="ctr"/>
+            <a:r>
+              <a:rPr lang="en-US" sz="4400" dirty="0">
+                <a:solidFill>
+                  <a:srgbClr val="00B050"/>
+                </a:solidFill>
+              </a:rPr>
+              <a:t>Email: </a:t>
+            </a:r>
+            <a:r>
+              <a:rPr lang="en-US" sz="4400" dirty="0">
+                <a:solidFill>
+                  <a:srgbClr val="00B050"/>
+                </a:solidFill>
+                <a:hlinkClick r:id="rId3"/>
+              </a:rPr>
+              <a:t>rickeyhp@gmail.com</a:t>
+            </a:r>
+            <a:endParaRPr lang="en-US" sz="4400" dirty="0">
+              <a:solidFill>
+                <a:srgbClr val="00B050"/>
+              </a:solidFill>
+            </a:endParaRPr>
+          </a:p>
+          <a:p>
+            <a:pPr algn="ctr"/>
+            <a:endParaRPr lang="en-US" sz="4400" dirty="0">
+              <a:solidFill>
+                <a:srgbClr val="00B050"/>
+              </a:solidFill>
+            </a:endParaRPr>
+          </a:p>
+          <a:p>
+            <a:pPr algn="ctr"/>
+            <a:r>
+              <a:rPr lang="en-US" sz="4400" dirty="0" err="1">
+                <a:solidFill>
+                  <a:srgbClr val="00B050"/>
+                </a:solidFill>
+              </a:rPr>
+              <a:t>Github</a:t>
+            </a:r>
+            <a:r>
+              <a:rPr lang="en-US" sz="4400" dirty="0">
+                <a:solidFill>
+                  <a:srgbClr val="00B050"/>
+                </a:solidFill>
+              </a:rPr>
+              <a:t>: </a:t>
+            </a:r>
+            <a:r>
+              <a:rPr lang="en-US" sz="4400" dirty="0" err="1">
+                <a:solidFill>
+                  <a:schemeClr val="accent1">
+                    <a:lumMod val="75000"/>
+                  </a:schemeClr>
+                </a:solidFill>
+              </a:rPr>
+              <a:t>RickPack</a:t>
+            </a:r>
+            <a:endParaRPr lang="en-US" sz="4400" dirty="0">
+              <a:solidFill>
+                <a:schemeClr val="accent1">
+                  <a:lumMod val="75000"/>
+                </a:schemeClr>
+              </a:solidFill>
+            </a:endParaRPr>
+          </a:p>
+          <a:p>
+            <a:pPr algn="ctr"/>
+            <a:endParaRPr lang="en-US" sz="4400" dirty="0">
+              <a:solidFill>
+                <a:srgbClr val="00B050"/>
+              </a:solidFill>
+            </a:endParaRPr>
+          </a:p>
+          <a:p>
+            <a:pPr algn="ctr"/>
+            <a:r>
+              <a:rPr lang="en-US" sz="4400" dirty="0">
+                <a:solidFill>
+                  <a:srgbClr val="00B050"/>
+                </a:solidFill>
+              </a:rPr>
+              <a:t>Twitter: </a:t>
+            </a:r>
+            <a:r>
+              <a:rPr lang="en-US" sz="4400" dirty="0">
+                <a:solidFill>
+                  <a:schemeClr val="accent1">
+                    <a:lumMod val="75000"/>
+                  </a:schemeClr>
+                </a:solidFill>
+              </a:rPr>
+              <a:t>@rick_pack2</a:t>
+            </a:r>
+          </a:p>
+        </p:txBody>
+      </p:sp>
+    </p:spTree>
+    <p:extLst>
+      <p:ext uri="{BB962C8B-B14F-4D97-AF65-F5344CB8AC3E}">
+        <p14:creationId xmlns:p14="http://schemas.microsoft.com/office/powerpoint/2010/main" val="2391572697"/>
+      </p:ext>
+    </p:extLst>
+  </p:cSld>
+  <p:clrMapOvr>
+    <a:masterClrMapping/>
+  </p:clrMapOvr>
+</p:sld>
+</file>
+
 <file path=ppt/slides/slide5.xml><?xml version="1.0" encoding="utf-8"?>
 <p:sld xmlns:a="http://schemas.openxmlformats.org/drawingml/2006/main" xmlns:r="http://schemas.openxmlformats.org/officeDocument/2006/relationships" xmlns:p="http://schemas.openxmlformats.org/presentationml/2006/main">
   <p:cSld>
@@ -13838,18 +14988,13 @@
           <a:p>
             <a:pPr algn="r"/>
             <a:r>
-              <a:rPr lang="en-US" sz="2400" u="sng" dirty="0" smtClean="0">
+              <a:rPr lang="en-US" sz="2400" u="sng" dirty="0">
                 <a:solidFill>
                   <a:srgbClr val="7030A0"/>
                 </a:solidFill>
               </a:rPr>
               <a:t>That’s me</a:t>
             </a:r>
-            <a:endParaRPr lang="en-US" sz="2400" u="sng" dirty="0">
-              <a:solidFill>
-                <a:srgbClr val="7030A0"/>
-              </a:solidFill>
-            </a:endParaRPr>
           </a:p>
         </p:txBody>
       </p:sp>
@@ -14183,18 +15328,13 @@
           <a:p>
             <a:pPr algn="r"/>
             <a:r>
-              <a:rPr lang="en-US" sz="2400" u="sng" dirty="0" smtClean="0">
+              <a:rPr lang="en-US" sz="2400" u="sng" dirty="0">
                 <a:solidFill>
                   <a:srgbClr val="7030A0"/>
                 </a:solidFill>
               </a:rPr>
               <a:t>That’s me</a:t>
             </a:r>
-            <a:endParaRPr lang="en-US" sz="2400" u="sng" dirty="0">
-              <a:solidFill>
-                <a:srgbClr val="7030A0"/>
-              </a:solidFill>
-            </a:endParaRPr>
           </a:p>
         </p:txBody>
       </p:sp>
@@ -14458,13 +15598,6 @@
   <p:clrMapOvr>
     <a:masterClrMapping/>
   </p:clrMapOvr>
-  <p:timing>
-    <p:tnLst>
-      <p:par>
-        <p:cTn id="1" dur="indefinite" restart="never" nodeType="tmRoot"/>
-      </p:par>
-    </p:tnLst>
-  </p:timing>
 </p:sld>
 </file>
 
@@ -14527,18 +15660,6 @@
               </a:rPr>
               <a:t>Global R-Ladies Events</a:t>
             </a:r>
-            <a:r>
-              <a:rPr lang="en" sz="4800">
-                <a:solidFill>
-                  <a:srgbClr val="3D85C6"/>
-                </a:solidFill>
-                <a:latin typeface="Bree Serif"/>
-                <a:ea typeface="Bree Serif"/>
-                <a:cs typeface="Bree Serif"/>
-                <a:sym typeface="Bree Serif"/>
-              </a:rPr>
-              <a:t/>
-            </a:r>
             <a:br>
               <a:rPr lang="en" sz="4800">
                 <a:solidFill>
@@ -14679,13 +15800,6 @@
   <p:clrMapOvr>
     <a:masterClrMapping/>
   </p:clrMapOvr>
-  <p:timing>
-    <p:tnLst>
-      <p:par>
-        <p:cTn id="1" dur="indefinite" restart="never" nodeType="tmRoot"/>
-      </p:par>
-    </p:tnLst>
-  </p:timing>
 </p:sld>
 </file>
 
@@ -14748,18 +15862,6 @@
               </a:rPr>
               <a:t>R-Ladies Chapters</a:t>
             </a:r>
-            <a:r>
-              <a:rPr lang="en" sz="4800">
-                <a:solidFill>
-                  <a:srgbClr val="3D85C6"/>
-                </a:solidFill>
-                <a:latin typeface="Bree Serif"/>
-                <a:ea typeface="Bree Serif"/>
-                <a:cs typeface="Bree Serif"/>
-                <a:sym typeface="Bree Serif"/>
-              </a:rPr>
-              <a:t/>
-            </a:r>
             <a:br>
               <a:rPr lang="en" sz="4800">
                 <a:solidFill>
@@ -14985,13 +16087,6 @@
   <p:clrMapOvr>
     <a:masterClrMapping/>
   </p:clrMapOvr>
-  <p:timing>
-    <p:tnLst>
-      <p:par>
-        <p:cTn id="1" dur="indefinite" restart="never" nodeType="tmRoot"/>
-      </p:par>
-    </p:tnLst>
-  </p:timing>
 </p:sld>
 </file>
 

</xml_diff>